<commit_message>
final commit with slides
</commit_message>
<xml_diff>
--- a/Slides/Slides.pptx
+++ b/Slides/Slides.pptx
@@ -5,29 +5,30 @@
     <p:sldMasterId id="2147483648" r:id="rId1"/>
   </p:sldMasterIdLst>
   <p:notesMasterIdLst>
-    <p:notesMasterId r:id="rId22"/>
+    <p:notesMasterId r:id="rId23"/>
   </p:notesMasterIdLst>
   <p:sldIdLst>
     <p:sldId id="256" r:id="rId2"/>
-    <p:sldId id="259" r:id="rId3"/>
-    <p:sldId id="260" r:id="rId4"/>
-    <p:sldId id="262" r:id="rId5"/>
-    <p:sldId id="261" r:id="rId6"/>
-    <p:sldId id="263" r:id="rId7"/>
-    <p:sldId id="265" r:id="rId8"/>
-    <p:sldId id="266" r:id="rId9"/>
-    <p:sldId id="267" r:id="rId10"/>
-    <p:sldId id="268" r:id="rId11"/>
-    <p:sldId id="269" r:id="rId12"/>
-    <p:sldId id="271" r:id="rId13"/>
-    <p:sldId id="270" r:id="rId14"/>
-    <p:sldId id="272" r:id="rId15"/>
-    <p:sldId id="273" r:id="rId16"/>
-    <p:sldId id="274" r:id="rId17"/>
-    <p:sldId id="275" r:id="rId18"/>
-    <p:sldId id="276" r:id="rId19"/>
-    <p:sldId id="277" r:id="rId20"/>
-    <p:sldId id="278" r:id="rId21"/>
+    <p:sldId id="283" r:id="rId3"/>
+    <p:sldId id="259" r:id="rId4"/>
+    <p:sldId id="260" r:id="rId5"/>
+    <p:sldId id="262" r:id="rId6"/>
+    <p:sldId id="261" r:id="rId7"/>
+    <p:sldId id="279" r:id="rId8"/>
+    <p:sldId id="284" r:id="rId9"/>
+    <p:sldId id="281" r:id="rId10"/>
+    <p:sldId id="263" r:id="rId11"/>
+    <p:sldId id="265" r:id="rId12"/>
+    <p:sldId id="266" r:id="rId13"/>
+    <p:sldId id="267" r:id="rId14"/>
+    <p:sldId id="285" r:id="rId15"/>
+    <p:sldId id="269" r:id="rId16"/>
+    <p:sldId id="272" r:id="rId17"/>
+    <p:sldId id="270" r:id="rId18"/>
+    <p:sldId id="273" r:id="rId19"/>
+    <p:sldId id="274" r:id="rId20"/>
+    <p:sldId id="282" r:id="rId21"/>
+    <p:sldId id="275" r:id="rId22"/>
   </p:sldIdLst>
   <p:sldSz cx="12192000" cy="6858000"/>
   <p:notesSz cx="6858000" cy="9144000"/>
@@ -1933,7 +1934,7 @@
         <p:cNvPr id="1" name="">
           <a:extLst>
             <a:ext uri="{FF2B5EF4-FFF2-40B4-BE49-F238E27FC236}">
-              <a16:creationId xmlns:a16="http://schemas.microsoft.com/office/drawing/2014/main" id="{8D292C76-2DF7-3189-EBAE-28E287724FC2}"/>
+              <a16:creationId xmlns:a16="http://schemas.microsoft.com/office/drawing/2014/main" id="{63D655CA-AAD5-48E6-A7ED-410FD849AF9A}"/>
             </a:ext>
           </a:extLst>
         </p:cNvPr>
@@ -1953,7 +1954,7 @@
           <p:cNvPr id="3" name="Title 2">
             <a:extLst>
               <a:ext uri="{FF2B5EF4-FFF2-40B4-BE49-F238E27FC236}">
-                <a16:creationId xmlns:a16="http://schemas.microsoft.com/office/drawing/2014/main" id="{5E43A0D5-F7FC-AFA9-B546-4B7D5F2C0F06}"/>
+                <a16:creationId xmlns:a16="http://schemas.microsoft.com/office/drawing/2014/main" id="{885EED14-FD22-B7EE-EA43-0FF59CF42CE6}"/>
               </a:ext>
             </a:extLst>
           </p:cNvPr>
@@ -1981,191 +1982,50 @@
                 <a:latin typeface="Verdana" panose="020B0604030504040204" pitchFamily="34" charset="0"/>
                 <a:ea typeface="Verdana" panose="020B0604030504040204" pitchFamily="34" charset="0"/>
               </a:rPr>
-              <a:t>DD - Other design choices</a:t>
+              <a:t>DD - Component View</a:t>
             </a:r>
           </a:p>
         </p:txBody>
       </p:sp>
-      <p:sp>
-        <p:nvSpPr>
-          <p:cNvPr id="4" name="TextBox 3">
+      <p:pic>
+        <p:nvPicPr>
+          <p:cNvPr id="5" name="Picture 4" descr="A diagram of a computer&#10;&#10;Description automatically generated">
             <a:extLst>
               <a:ext uri="{FF2B5EF4-FFF2-40B4-BE49-F238E27FC236}">
-                <a16:creationId xmlns:a16="http://schemas.microsoft.com/office/drawing/2014/main" id="{EF2DB82A-BA1F-63D0-A785-7D5DB60D1526}"/>
+                <a16:creationId xmlns:a16="http://schemas.microsoft.com/office/drawing/2014/main" id="{0B545099-0713-9382-EE42-A3293A92E584}"/>
               </a:ext>
             </a:extLst>
           </p:cNvPr>
-          <p:cNvSpPr txBox="1"/>
+          <p:cNvPicPr>
+            <a:picLocks noChangeAspect="1"/>
+          </p:cNvPicPr>
           <p:nvPr/>
-        </p:nvSpPr>
-        <p:spPr>
-          <a:xfrm>
-            <a:off x="689298" y="1449109"/>
-            <a:ext cx="10068897" cy="3924151"/>
+        </p:nvPicPr>
+        <p:blipFill rotWithShape="1">
+          <a:blip r:embed="rId2">
+            <a:extLst>
+              <a:ext uri="{28A0092B-C50C-407E-A947-70E740481C1C}">
+                <a14:useLocalDpi xmlns:a14="http://schemas.microsoft.com/office/drawing/2010/main" val="0"/>
+              </a:ext>
+            </a:extLst>
+          </a:blip>
+          <a:srcRect t="3929" b="4126"/>
+          <a:stretch/>
+        </p:blipFill>
+        <p:spPr>
+          <a:xfrm>
+            <a:off x="1969800" y="1155627"/>
+            <a:ext cx="8252400" cy="4974764"/>
           </a:xfrm>
           <a:prstGeom prst="rect">
             <a:avLst/>
           </a:prstGeom>
-          <a:noFill/>
-        </p:spPr>
-        <p:txBody>
-          <a:bodyPr wrap="square">
-            <a:spAutoFit/>
-          </a:bodyPr>
-          <a:lstStyle/>
-          <a:p>
-            <a:pPr>
-              <a:spcAft>
-                <a:spcPts val="600"/>
-              </a:spcAft>
-            </a:pPr>
-            <a:r>
-              <a:rPr lang="en-GB" b="1" dirty="0"/>
-              <a:t>Relational Database</a:t>
-            </a:r>
-          </a:p>
-          <a:p>
-            <a:r>
-              <a:rPr lang="en-GB" dirty="0"/>
-              <a:t>a.</a:t>
-            </a:r>
-            <a:r>
-              <a:rPr lang="en-GB" b="0" i="0" dirty="0">
-                <a:effectLst/>
-              </a:rPr>
-              <a:t> </a:t>
-            </a:r>
-            <a:r>
-              <a:rPr lang="en-GB" dirty="0"/>
-              <a:t>ACID</a:t>
-            </a:r>
-            <a:endParaRPr lang="en-GB" sz="1800" dirty="0"/>
-          </a:p>
-          <a:p>
-            <a:pPr>
-              <a:spcAft>
-                <a:spcPts val="600"/>
-              </a:spcAft>
-            </a:pPr>
-            <a:r>
-              <a:rPr lang="en-GB" dirty="0"/>
-              <a:t>b.</a:t>
-            </a:r>
-            <a:r>
-              <a:rPr lang="en-GB" sz="1800" dirty="0"/>
-              <a:t> </a:t>
-            </a:r>
-            <a:r>
-              <a:rPr lang="en-GB" i="0" dirty="0">
-                <a:effectLst/>
-              </a:rPr>
-              <a:t>Widespread Language Support</a:t>
-            </a:r>
-            <a:br>
-              <a:rPr lang="en-GB" b="1" i="0" dirty="0">
-                <a:effectLst/>
-              </a:rPr>
-            </a:br>
-            <a:br>
-              <a:rPr lang="en-GB" b="1" i="0" dirty="0">
-                <a:effectLst/>
-              </a:rPr>
-            </a:br>
-            <a:r>
-              <a:rPr lang="en-GB" b="1" dirty="0"/>
-              <a:t>Token-Based Authentication and Authorization</a:t>
-            </a:r>
-          </a:p>
-          <a:p>
-            <a:pPr marL="342900" indent="-342900">
-              <a:buAutoNum type="alphaLcPeriod"/>
-            </a:pPr>
-            <a:r>
-              <a:rPr lang="en-GB" dirty="0">
-                <a:latin typeface="Söhne"/>
-              </a:rPr>
-              <a:t>Compatibility with REST</a:t>
-            </a:r>
-          </a:p>
-          <a:p>
-            <a:pPr marL="342900" indent="-342900">
-              <a:buAutoNum type="alphaLcPeriod"/>
-            </a:pPr>
-            <a:r>
-              <a:rPr lang="en-GB" i="0" dirty="0">
-                <a:effectLst/>
-                <a:latin typeface="Söhne"/>
-              </a:rPr>
-              <a:t>Performance (Reducing database load)</a:t>
-            </a:r>
-          </a:p>
-          <a:p>
-            <a:pPr marL="342900" indent="-342900">
-              <a:buAutoNum type="alphaLcPeriod"/>
-            </a:pPr>
-            <a:r>
-              <a:rPr lang="en-GB" dirty="0">
-                <a:latin typeface="Söhne"/>
-              </a:rPr>
-              <a:t>C</a:t>
-            </a:r>
-            <a:r>
-              <a:rPr lang="en-GB" i="0" dirty="0">
-                <a:effectLst/>
-                <a:latin typeface="Söhne"/>
-              </a:rPr>
-              <a:t>ookies complicate scalability</a:t>
-            </a:r>
-          </a:p>
-          <a:p>
-            <a:pPr marL="342900" indent="-342900">
-              <a:buAutoNum type="alphaLcPeriod"/>
-            </a:pPr>
-            <a:endParaRPr lang="en-GB" dirty="0">
-              <a:latin typeface="Söhne"/>
-            </a:endParaRPr>
-          </a:p>
-          <a:p>
-            <a:pPr>
-              <a:spcAft>
-                <a:spcPts val="600"/>
-              </a:spcAft>
-            </a:pPr>
-            <a:r>
-              <a:rPr lang="en-GB" b="1" dirty="0"/>
-              <a:t>Distributed MVC</a:t>
-            </a:r>
-          </a:p>
-          <a:p>
-            <a:pPr marL="342900" indent="-342900">
-              <a:buAutoNum type="alphaLcPeriod"/>
-            </a:pPr>
-            <a:r>
-              <a:rPr lang="en-GB" dirty="0"/>
-              <a:t>Compatibility with 3-tier</a:t>
-            </a:r>
-          </a:p>
-          <a:p>
-            <a:pPr marL="342900" indent="-342900">
-              <a:buAutoNum type="alphaLcPeriod"/>
-            </a:pPr>
-            <a:r>
-              <a:rPr lang="en-GB" dirty="0"/>
-              <a:t>Maintainability</a:t>
-            </a:r>
-          </a:p>
-          <a:p>
-            <a:pPr marL="342900" indent="-342900">
-              <a:buAutoNum type="alphaLcPeriod"/>
-            </a:pPr>
-            <a:endParaRPr lang="en-GB" dirty="0"/>
-          </a:p>
-        </p:txBody>
-      </p:sp>
+        </p:spPr>
+      </p:pic>
     </p:spTree>
     <p:extLst>
       <p:ext uri="{BB962C8B-B14F-4D97-AF65-F5344CB8AC3E}">
-        <p14:creationId xmlns:p14="http://schemas.microsoft.com/office/powerpoint/2010/main" val="191864213"/>
+        <p14:creationId xmlns:p14="http://schemas.microsoft.com/office/powerpoint/2010/main" val="742634822"/>
       </p:ext>
     </p:extLst>
   </p:cSld>
@@ -2176,6 +2036,807 @@
 </file>
 
 <file path=ppt/slides/slide11.xml><?xml version="1.0" encoding="utf-8"?>
+<p:sld xmlns:a="http://schemas.openxmlformats.org/drawingml/2006/main" xmlns:r="http://schemas.openxmlformats.org/officeDocument/2006/relationships" xmlns:p="http://schemas.openxmlformats.org/presentationml/2006/main">
+  <p:cSld>
+    <p:spTree>
+      <p:nvGrpSpPr>
+        <p:cNvPr id="1" name="">
+          <a:extLst>
+            <a:ext uri="{FF2B5EF4-FFF2-40B4-BE49-F238E27FC236}">
+              <a16:creationId xmlns:a16="http://schemas.microsoft.com/office/drawing/2014/main" id="{5169B7E9-FC87-EA62-B838-B5659C2DD0A2}"/>
+            </a:ext>
+          </a:extLst>
+        </p:cNvPr>
+        <p:cNvGrpSpPr/>
+        <p:nvPr/>
+      </p:nvGrpSpPr>
+      <p:grpSpPr>
+        <a:xfrm>
+          <a:off x="0" y="0"/>
+          <a:ext cx="0" cy="0"/>
+          <a:chOff x="0" y="0"/>
+          <a:chExt cx="0" cy="0"/>
+        </a:xfrm>
+      </p:grpSpPr>
+      <p:sp>
+        <p:nvSpPr>
+          <p:cNvPr id="3" name="Title 2">
+            <a:extLst>
+              <a:ext uri="{FF2B5EF4-FFF2-40B4-BE49-F238E27FC236}">
+                <a16:creationId xmlns:a16="http://schemas.microsoft.com/office/drawing/2014/main" id="{8A3BA3C1-B692-ED60-6BFF-BE9D2259FF8B}"/>
+              </a:ext>
+            </a:extLst>
+          </p:cNvPr>
+          <p:cNvSpPr>
+            <a:spLocks noGrp="1"/>
+          </p:cNvSpPr>
+          <p:nvPr>
+            <p:ph type="title"/>
+          </p:nvPr>
+        </p:nvSpPr>
+        <p:spPr>
+          <a:xfrm>
+            <a:off x="254645" y="137270"/>
+            <a:ext cx="6971271" cy="543697"/>
+          </a:xfrm>
+        </p:spPr>
+        <p:txBody>
+          <a:bodyPr>
+            <a:normAutofit/>
+          </a:bodyPr>
+          <a:lstStyle/>
+          <a:p>
+            <a:r>
+              <a:rPr lang="it-IT" dirty="0">
+                <a:latin typeface="Verdana" panose="020B0604030504040204" pitchFamily="34" charset="0"/>
+                <a:ea typeface="Verdana" panose="020B0604030504040204" pitchFamily="34" charset="0"/>
+              </a:rPr>
+              <a:t>DD - Architecture</a:t>
+            </a:r>
+          </a:p>
+        </p:txBody>
+      </p:sp>
+      <p:sp>
+        <p:nvSpPr>
+          <p:cNvPr id="4" name="TextBox 3">
+            <a:extLst>
+              <a:ext uri="{FF2B5EF4-FFF2-40B4-BE49-F238E27FC236}">
+                <a16:creationId xmlns:a16="http://schemas.microsoft.com/office/drawing/2014/main" id="{5F85165E-4E44-4A85-653B-FBD4D39D7A47}"/>
+              </a:ext>
+            </a:extLst>
+          </p:cNvPr>
+          <p:cNvSpPr txBox="1"/>
+          <p:nvPr/>
+        </p:nvSpPr>
+        <p:spPr>
+          <a:xfrm>
+            <a:off x="689298" y="1449109"/>
+            <a:ext cx="10068897" cy="3924151"/>
+          </a:xfrm>
+          <a:prstGeom prst="rect">
+            <a:avLst/>
+          </a:prstGeom>
+          <a:noFill/>
+        </p:spPr>
+        <p:txBody>
+          <a:bodyPr wrap="square">
+            <a:spAutoFit/>
+          </a:bodyPr>
+          <a:lstStyle/>
+          <a:p>
+            <a:pPr>
+              <a:spcAft>
+                <a:spcPts val="600"/>
+              </a:spcAft>
+            </a:pPr>
+            <a:r>
+              <a:rPr lang="en-GB" b="1" dirty="0"/>
+              <a:t>Three-Tier Architecture</a:t>
+            </a:r>
+          </a:p>
+          <a:p>
+            <a:pPr marL="342900" indent="-342900">
+              <a:buAutoNum type="alphaLcPeriod"/>
+            </a:pPr>
+            <a:r>
+              <a:rPr lang="en-GB" b="0" i="0" dirty="0">
+                <a:effectLst/>
+              </a:rPr>
+              <a:t>Modern interpretation of the 3-tier architecture, utilizing contemporary technologies.</a:t>
+            </a:r>
+          </a:p>
+          <a:p>
+            <a:pPr marL="342900" indent="-342900">
+              <a:buAutoNum type="alphaLcPeriod"/>
+            </a:pPr>
+            <a:r>
+              <a:rPr lang="en-GB" dirty="0"/>
+              <a:t>N</a:t>
+            </a:r>
+            <a:r>
+              <a:rPr lang="en-GB" b="0" i="0" dirty="0">
+                <a:effectLst/>
+              </a:rPr>
+              <a:t>ginx serves static content (React app) to the browser.</a:t>
+            </a:r>
+          </a:p>
+          <a:p>
+            <a:pPr marL="342900" indent="-342900">
+              <a:buAutoNum type="alphaLcPeriod"/>
+            </a:pPr>
+            <a:r>
+              <a:rPr lang="en-GB" dirty="0"/>
+              <a:t>The rest </a:t>
+            </a:r>
+            <a:r>
+              <a:rPr lang="en-GB" b="0" i="0" dirty="0">
+                <a:effectLst/>
+              </a:rPr>
+              <a:t>of the Presentation layer and the Application layer implemented by our Spring application.</a:t>
+            </a:r>
+          </a:p>
+          <a:p>
+            <a:pPr marL="342900" indent="-342900">
+              <a:buAutoNum type="alphaLcPeriod"/>
+            </a:pPr>
+            <a:r>
+              <a:rPr lang="en-GB" b="0" i="0" dirty="0">
+                <a:effectLst/>
+              </a:rPr>
+              <a:t>The Data layer is managed by a relational database hosted on DigitalOcean's cloud infrastructure.</a:t>
+            </a:r>
+          </a:p>
+          <a:p>
+            <a:endParaRPr lang="en-GB" sz="1800" dirty="0"/>
+          </a:p>
+          <a:p>
+            <a:pPr>
+              <a:spcAft>
+                <a:spcPts val="600"/>
+              </a:spcAft>
+            </a:pPr>
+            <a:r>
+              <a:rPr lang="en-GB" b="1" dirty="0"/>
+              <a:t>RESTful APIs</a:t>
+            </a:r>
+          </a:p>
+          <a:p>
+            <a:pPr marL="342900" indent="-342900">
+              <a:buAutoNum type="alphaLcPeriod"/>
+            </a:pPr>
+            <a:r>
+              <a:rPr lang="en-GB" dirty="0"/>
+              <a:t>The client retrieves the resources by sending HTTP requests to our server.</a:t>
+            </a:r>
+          </a:p>
+          <a:p>
+            <a:pPr marL="342900" indent="-342900">
+              <a:buAutoNum type="alphaLcPeriod"/>
+            </a:pPr>
+            <a:r>
+              <a:rPr lang="en-GB" dirty="0"/>
+              <a:t>Stateless.</a:t>
+            </a:r>
+          </a:p>
+          <a:p>
+            <a:endParaRPr lang="en-GB" sz="1800" b="1" dirty="0"/>
+          </a:p>
+          <a:p>
+            <a:pPr>
+              <a:spcAft>
+                <a:spcPts val="600"/>
+              </a:spcAft>
+            </a:pPr>
+            <a:r>
+              <a:rPr lang="en-GB" b="1" dirty="0"/>
+              <a:t>On-Cloud</a:t>
+            </a:r>
+          </a:p>
+          <a:p>
+            <a:pPr marL="342900" indent="-342900">
+              <a:buAutoNum type="alphaLcPeriod"/>
+            </a:pPr>
+            <a:r>
+              <a:rPr lang="en-GB" dirty="0"/>
+              <a:t>Our system is entirely hosted on Cloud.</a:t>
+            </a:r>
+          </a:p>
+          <a:p>
+            <a:endParaRPr lang="en-GB" sz="1800" b="1" dirty="0"/>
+          </a:p>
+        </p:txBody>
+      </p:sp>
+    </p:spTree>
+    <p:extLst>
+      <p:ext uri="{BB962C8B-B14F-4D97-AF65-F5344CB8AC3E}">
+        <p14:creationId xmlns:p14="http://schemas.microsoft.com/office/powerpoint/2010/main" val="1729995777"/>
+      </p:ext>
+    </p:extLst>
+  </p:cSld>
+  <p:clrMapOvr>
+    <a:masterClrMapping/>
+  </p:clrMapOvr>
+</p:sld>
+</file>
+
+<file path=ppt/slides/slide12.xml><?xml version="1.0" encoding="utf-8"?>
+<p:sld xmlns:a="http://schemas.openxmlformats.org/drawingml/2006/main" xmlns:r="http://schemas.openxmlformats.org/officeDocument/2006/relationships" xmlns:p="http://schemas.openxmlformats.org/presentationml/2006/main">
+  <p:cSld>
+    <p:spTree>
+      <p:nvGrpSpPr>
+        <p:cNvPr id="1" name="">
+          <a:extLst>
+            <a:ext uri="{FF2B5EF4-FFF2-40B4-BE49-F238E27FC236}">
+              <a16:creationId xmlns:a16="http://schemas.microsoft.com/office/drawing/2014/main" id="{91CA18F1-84A4-C1A7-AF7C-761853EA7C2D}"/>
+            </a:ext>
+          </a:extLst>
+        </p:cNvPr>
+        <p:cNvGrpSpPr/>
+        <p:nvPr/>
+      </p:nvGrpSpPr>
+      <p:grpSpPr>
+        <a:xfrm>
+          <a:off x="0" y="0"/>
+          <a:ext cx="0" cy="0"/>
+          <a:chOff x="0" y="0"/>
+          <a:chExt cx="0" cy="0"/>
+        </a:xfrm>
+      </p:grpSpPr>
+      <p:sp>
+        <p:nvSpPr>
+          <p:cNvPr id="3" name="Title 2">
+            <a:extLst>
+              <a:ext uri="{FF2B5EF4-FFF2-40B4-BE49-F238E27FC236}">
+                <a16:creationId xmlns:a16="http://schemas.microsoft.com/office/drawing/2014/main" id="{B53493E1-25A4-E25B-05BB-2A10570D2056}"/>
+              </a:ext>
+            </a:extLst>
+          </p:cNvPr>
+          <p:cNvSpPr>
+            <a:spLocks noGrp="1"/>
+          </p:cNvSpPr>
+          <p:nvPr>
+            <p:ph type="title"/>
+          </p:nvPr>
+        </p:nvSpPr>
+        <p:spPr>
+          <a:xfrm>
+            <a:off x="254645" y="137270"/>
+            <a:ext cx="6971271" cy="543697"/>
+          </a:xfrm>
+        </p:spPr>
+        <p:txBody>
+          <a:bodyPr>
+            <a:normAutofit/>
+          </a:bodyPr>
+          <a:lstStyle/>
+          <a:p>
+            <a:r>
+              <a:rPr lang="it-IT" dirty="0">
+                <a:latin typeface="Verdana" panose="020B0604030504040204" pitchFamily="34" charset="0"/>
+                <a:ea typeface="Verdana" panose="020B0604030504040204" pitchFamily="34" charset="0"/>
+              </a:rPr>
+              <a:t>DD - Architecture</a:t>
+            </a:r>
+          </a:p>
+        </p:txBody>
+      </p:sp>
+      <p:sp>
+        <p:nvSpPr>
+          <p:cNvPr id="4" name="TextBox 3">
+            <a:extLst>
+              <a:ext uri="{FF2B5EF4-FFF2-40B4-BE49-F238E27FC236}">
+                <a16:creationId xmlns:a16="http://schemas.microsoft.com/office/drawing/2014/main" id="{F8A206A6-C18B-C590-FB74-10DF7D28CA14}"/>
+              </a:ext>
+            </a:extLst>
+          </p:cNvPr>
+          <p:cNvSpPr txBox="1"/>
+          <p:nvPr/>
+        </p:nvSpPr>
+        <p:spPr>
+          <a:xfrm>
+            <a:off x="689298" y="1449109"/>
+            <a:ext cx="10068897" cy="3801041"/>
+          </a:xfrm>
+          <a:prstGeom prst="rect">
+            <a:avLst/>
+          </a:prstGeom>
+          <a:noFill/>
+        </p:spPr>
+        <p:txBody>
+          <a:bodyPr wrap="square">
+            <a:spAutoFit/>
+          </a:bodyPr>
+          <a:lstStyle/>
+          <a:p>
+            <a:pPr>
+              <a:spcAft>
+                <a:spcPts val="600"/>
+              </a:spcAft>
+            </a:pPr>
+            <a:r>
+              <a:rPr lang="en-GB" b="1" dirty="0"/>
+              <a:t>Why not Microservices?</a:t>
+            </a:r>
+          </a:p>
+          <a:p>
+            <a:pPr marL="342900" indent="-342900">
+              <a:buAutoNum type="alphaLcPeriod"/>
+            </a:pPr>
+            <a:r>
+              <a:rPr lang="en-GB" b="0" i="0" dirty="0">
+                <a:effectLst/>
+              </a:rPr>
+              <a:t>Steep learning curve</a:t>
+            </a:r>
+          </a:p>
+          <a:p>
+            <a:pPr marL="342900" indent="-342900">
+              <a:buAutoNum type="alphaLcPeriod"/>
+            </a:pPr>
+            <a:r>
+              <a:rPr lang="en-GB" sz="1800" dirty="0"/>
+              <a:t>The system is smal</a:t>
+            </a:r>
+            <a:r>
+              <a:rPr lang="en-GB" dirty="0"/>
+              <a:t>l</a:t>
+            </a:r>
+            <a:endParaRPr lang="en-GB" sz="1800" dirty="0"/>
+          </a:p>
+          <a:p>
+            <a:endParaRPr lang="en-GB" sz="1800" dirty="0"/>
+          </a:p>
+          <a:p>
+            <a:pPr>
+              <a:spcAft>
+                <a:spcPts val="600"/>
+              </a:spcAft>
+            </a:pPr>
+            <a:r>
+              <a:rPr lang="en-GB" b="1" dirty="0"/>
+              <a:t>Why RESTful APIs?</a:t>
+            </a:r>
+          </a:p>
+          <a:p>
+            <a:pPr marL="342900" indent="-342900">
+              <a:buAutoNum type="alphaLcPeriod"/>
+            </a:pPr>
+            <a:r>
+              <a:rPr lang="en-GB" sz="1800" dirty="0"/>
+              <a:t>Simplicity</a:t>
+            </a:r>
+          </a:p>
+          <a:p>
+            <a:pPr marL="342900" indent="-342900">
+              <a:buAutoNum type="alphaLcPeriod"/>
+            </a:pPr>
+            <a:r>
+              <a:rPr lang="en-GB" sz="1800" dirty="0"/>
+              <a:t>Standardization</a:t>
+            </a:r>
+          </a:p>
+          <a:p>
+            <a:endParaRPr lang="en-GB" sz="1800" b="1" dirty="0"/>
+          </a:p>
+          <a:p>
+            <a:pPr>
+              <a:spcAft>
+                <a:spcPts val="600"/>
+              </a:spcAft>
+            </a:pPr>
+            <a:r>
+              <a:rPr lang="en-GB" b="1" dirty="0"/>
+              <a:t>On-Cloud</a:t>
+            </a:r>
+          </a:p>
+          <a:p>
+            <a:pPr marL="342900" indent="-342900">
+              <a:spcAft>
+                <a:spcPts val="600"/>
+              </a:spcAft>
+              <a:buAutoNum type="alphaLcPeriod"/>
+            </a:pPr>
+            <a:r>
+              <a:rPr lang="en-GB" i="0" dirty="0">
+                <a:effectLst/>
+              </a:rPr>
+              <a:t>Availability</a:t>
+            </a:r>
+          </a:p>
+          <a:p>
+            <a:pPr marL="342900" indent="-342900">
+              <a:spcAft>
+                <a:spcPts val="600"/>
+              </a:spcAft>
+              <a:buAutoNum type="alphaLcPeriod"/>
+            </a:pPr>
+            <a:r>
+              <a:rPr lang="en-GB" i="0" dirty="0">
+                <a:effectLst/>
+              </a:rPr>
+              <a:t>Scalability</a:t>
+            </a:r>
+          </a:p>
+          <a:p>
+            <a:pPr>
+              <a:spcAft>
+                <a:spcPts val="600"/>
+              </a:spcAft>
+            </a:pPr>
+            <a:endParaRPr lang="en-GB" dirty="0"/>
+          </a:p>
+        </p:txBody>
+      </p:sp>
+    </p:spTree>
+    <p:extLst>
+      <p:ext uri="{BB962C8B-B14F-4D97-AF65-F5344CB8AC3E}">
+        <p14:creationId xmlns:p14="http://schemas.microsoft.com/office/powerpoint/2010/main" val="3194443352"/>
+      </p:ext>
+    </p:extLst>
+  </p:cSld>
+  <p:clrMapOvr>
+    <a:masterClrMapping/>
+  </p:clrMapOvr>
+</p:sld>
+</file>
+
+<file path=ppt/slides/slide13.xml><?xml version="1.0" encoding="utf-8"?>
+<p:sld xmlns:a="http://schemas.openxmlformats.org/drawingml/2006/main" xmlns:r="http://schemas.openxmlformats.org/officeDocument/2006/relationships" xmlns:p="http://schemas.openxmlformats.org/presentationml/2006/main">
+  <p:cSld>
+    <p:spTree>
+      <p:nvGrpSpPr>
+        <p:cNvPr id="1" name="">
+          <a:extLst>
+            <a:ext uri="{FF2B5EF4-FFF2-40B4-BE49-F238E27FC236}">
+              <a16:creationId xmlns:a16="http://schemas.microsoft.com/office/drawing/2014/main" id="{11A83AB1-8499-8DCA-9033-EFD2BEFF88ED}"/>
+            </a:ext>
+          </a:extLst>
+        </p:cNvPr>
+        <p:cNvGrpSpPr/>
+        <p:nvPr/>
+      </p:nvGrpSpPr>
+      <p:grpSpPr>
+        <a:xfrm>
+          <a:off x="0" y="0"/>
+          <a:ext cx="0" cy="0"/>
+          <a:chOff x="0" y="0"/>
+          <a:chExt cx="0" cy="0"/>
+        </a:xfrm>
+      </p:grpSpPr>
+      <p:sp>
+        <p:nvSpPr>
+          <p:cNvPr id="3" name="Title 2">
+            <a:extLst>
+              <a:ext uri="{FF2B5EF4-FFF2-40B4-BE49-F238E27FC236}">
+                <a16:creationId xmlns:a16="http://schemas.microsoft.com/office/drawing/2014/main" id="{C5EFB38F-B749-9392-F44D-C2448D7D5EA3}"/>
+              </a:ext>
+            </a:extLst>
+          </p:cNvPr>
+          <p:cNvSpPr>
+            <a:spLocks noGrp="1"/>
+          </p:cNvSpPr>
+          <p:nvPr>
+            <p:ph type="title"/>
+          </p:nvPr>
+        </p:nvSpPr>
+        <p:spPr>
+          <a:xfrm>
+            <a:off x="254645" y="137270"/>
+            <a:ext cx="6971271" cy="543697"/>
+          </a:xfrm>
+        </p:spPr>
+        <p:txBody>
+          <a:bodyPr>
+            <a:normAutofit/>
+          </a:bodyPr>
+          <a:lstStyle/>
+          <a:p>
+            <a:r>
+              <a:rPr lang="it-IT" dirty="0">
+                <a:latin typeface="Verdana" panose="020B0604030504040204" pitchFamily="34" charset="0"/>
+                <a:ea typeface="Verdana" panose="020B0604030504040204" pitchFamily="34" charset="0"/>
+              </a:rPr>
+              <a:t>DD - Other design choices</a:t>
+            </a:r>
+          </a:p>
+        </p:txBody>
+      </p:sp>
+      <p:sp>
+        <p:nvSpPr>
+          <p:cNvPr id="4" name="TextBox 3">
+            <a:extLst>
+              <a:ext uri="{FF2B5EF4-FFF2-40B4-BE49-F238E27FC236}">
+                <a16:creationId xmlns:a16="http://schemas.microsoft.com/office/drawing/2014/main" id="{C2E4C377-52A6-6FE8-300D-F632DB2F584B}"/>
+              </a:ext>
+            </a:extLst>
+          </p:cNvPr>
+          <p:cNvSpPr txBox="1"/>
+          <p:nvPr/>
+        </p:nvSpPr>
+        <p:spPr>
+          <a:xfrm>
+            <a:off x="689298" y="1449109"/>
+            <a:ext cx="10068897" cy="4278094"/>
+          </a:xfrm>
+          <a:prstGeom prst="rect">
+            <a:avLst/>
+          </a:prstGeom>
+          <a:noFill/>
+        </p:spPr>
+        <p:txBody>
+          <a:bodyPr wrap="square">
+            <a:spAutoFit/>
+          </a:bodyPr>
+          <a:lstStyle/>
+          <a:p>
+            <a:pPr>
+              <a:spcAft>
+                <a:spcPts val="600"/>
+              </a:spcAft>
+            </a:pPr>
+            <a:r>
+              <a:rPr lang="en-GB" b="1" dirty="0"/>
+              <a:t>Relational Database</a:t>
+            </a:r>
+          </a:p>
+          <a:p>
+            <a:pPr marL="342900" indent="-342900">
+              <a:buAutoNum type="alphaLcPeriod"/>
+            </a:pPr>
+            <a:r>
+              <a:rPr lang="en-GB" dirty="0">
+                <a:latin typeface="Söhne"/>
+              </a:rPr>
+              <a:t>ACID</a:t>
+            </a:r>
+          </a:p>
+          <a:p>
+            <a:pPr marL="342900" indent="-342900">
+              <a:buAutoNum type="alphaLcPeriod"/>
+            </a:pPr>
+            <a:r>
+              <a:rPr lang="en-GB" i="0" dirty="0">
+                <a:effectLst/>
+                <a:latin typeface="Söhne"/>
+              </a:rPr>
+              <a:t>Widespread language </a:t>
+            </a:r>
+            <a:r>
+              <a:rPr lang="en-GB" dirty="0">
+                <a:latin typeface="Söhne"/>
+              </a:rPr>
+              <a:t>s</a:t>
+            </a:r>
+            <a:r>
+              <a:rPr lang="en-GB" i="0" dirty="0">
+                <a:effectLst/>
+                <a:latin typeface="Söhne"/>
+              </a:rPr>
+              <a:t>upport</a:t>
+            </a:r>
+          </a:p>
+          <a:p>
+            <a:pPr>
+              <a:spcAft>
+                <a:spcPts val="600"/>
+              </a:spcAft>
+            </a:pPr>
+            <a:br>
+              <a:rPr lang="en-GB" b="1" i="0" dirty="0">
+                <a:effectLst/>
+              </a:rPr>
+            </a:br>
+            <a:r>
+              <a:rPr lang="en-GB" b="1" dirty="0"/>
+              <a:t>Token-Based Authentication and Authorization</a:t>
+            </a:r>
+          </a:p>
+          <a:p>
+            <a:pPr marL="342900" indent="-342900">
+              <a:buAutoNum type="alphaLcPeriod"/>
+            </a:pPr>
+            <a:r>
+              <a:rPr lang="en-GB" dirty="0">
+                <a:latin typeface="Söhne"/>
+              </a:rPr>
+              <a:t>Compatibility with REST</a:t>
+            </a:r>
+          </a:p>
+          <a:p>
+            <a:pPr marL="342900" indent="-342900">
+              <a:buAutoNum type="alphaLcPeriod"/>
+            </a:pPr>
+            <a:r>
+              <a:rPr lang="en-GB" i="0" dirty="0">
+                <a:effectLst/>
+                <a:latin typeface="Söhne"/>
+              </a:rPr>
+              <a:t>Scalability</a:t>
+            </a:r>
+          </a:p>
+          <a:p>
+            <a:endParaRPr lang="en-GB" dirty="0">
+              <a:latin typeface="Söhne"/>
+            </a:endParaRPr>
+          </a:p>
+          <a:p>
+            <a:pPr>
+              <a:spcAft>
+                <a:spcPts val="600"/>
+              </a:spcAft>
+            </a:pPr>
+            <a:r>
+              <a:rPr lang="en-GB" b="1" dirty="0"/>
+              <a:t>Distributed MVC</a:t>
+            </a:r>
+          </a:p>
+          <a:p>
+            <a:pPr marL="342900" indent="-342900">
+              <a:buAutoNum type="alphaLcPeriod"/>
+            </a:pPr>
+            <a:r>
+              <a:rPr lang="en-GB" dirty="0"/>
+              <a:t>Compatibility with 3-tier</a:t>
+            </a:r>
+          </a:p>
+          <a:p>
+            <a:pPr marL="342900" indent="-342900">
+              <a:buAutoNum type="alphaLcPeriod"/>
+            </a:pPr>
+            <a:r>
+              <a:rPr lang="en-GB" dirty="0"/>
+              <a:t>Maintainability</a:t>
+            </a:r>
+          </a:p>
+          <a:p>
+            <a:pPr marL="342900" indent="-342900">
+              <a:buAutoNum type="alphaLcPeriod"/>
+            </a:pPr>
+            <a:endParaRPr lang="en-GB" dirty="0"/>
+          </a:p>
+          <a:p>
+            <a:pPr>
+              <a:spcAft>
+                <a:spcPts val="600"/>
+              </a:spcAft>
+            </a:pPr>
+            <a:r>
+              <a:rPr lang="en-GB" b="1" dirty="0"/>
+              <a:t>HTTPS</a:t>
+            </a:r>
+          </a:p>
+          <a:p>
+            <a:pPr marL="342900" indent="-342900">
+              <a:spcAft>
+                <a:spcPts val="600"/>
+              </a:spcAft>
+              <a:buAutoNum type="alphaLcPeriod"/>
+            </a:pPr>
+            <a:r>
+              <a:rPr lang="en-GB" dirty="0"/>
+              <a:t>Security</a:t>
+            </a:r>
+          </a:p>
+        </p:txBody>
+      </p:sp>
+    </p:spTree>
+    <p:extLst>
+      <p:ext uri="{BB962C8B-B14F-4D97-AF65-F5344CB8AC3E}">
+        <p14:creationId xmlns:p14="http://schemas.microsoft.com/office/powerpoint/2010/main" val="281468513"/>
+      </p:ext>
+    </p:extLst>
+  </p:cSld>
+  <p:clrMapOvr>
+    <a:masterClrMapping/>
+  </p:clrMapOvr>
+</p:sld>
+</file>
+
+<file path=ppt/slides/slide14.xml><?xml version="1.0" encoding="utf-8"?>
+<p:sld xmlns:a="http://schemas.openxmlformats.org/drawingml/2006/main" xmlns:r="http://schemas.openxmlformats.org/officeDocument/2006/relationships" xmlns:p="http://schemas.openxmlformats.org/presentationml/2006/main">
+  <p:cSld>
+    <p:spTree>
+      <p:nvGrpSpPr>
+        <p:cNvPr id="1" name="">
+          <a:extLst>
+            <a:ext uri="{FF2B5EF4-FFF2-40B4-BE49-F238E27FC236}">
+              <a16:creationId xmlns:a16="http://schemas.microsoft.com/office/drawing/2014/main" id="{95058546-8562-D48F-7436-47C6D0BCF74A}"/>
+            </a:ext>
+          </a:extLst>
+        </p:cNvPr>
+        <p:cNvGrpSpPr/>
+        <p:nvPr/>
+      </p:nvGrpSpPr>
+      <p:grpSpPr>
+        <a:xfrm>
+          <a:off x="0" y="0"/>
+          <a:ext cx="0" cy="0"/>
+          <a:chOff x="0" y="0"/>
+          <a:chExt cx="0" cy="0"/>
+        </a:xfrm>
+      </p:grpSpPr>
+      <p:sp>
+        <p:nvSpPr>
+          <p:cNvPr id="9" name="Title 8">
+            <a:extLst>
+              <a:ext uri="{FF2B5EF4-FFF2-40B4-BE49-F238E27FC236}">
+                <a16:creationId xmlns:a16="http://schemas.microsoft.com/office/drawing/2014/main" id="{E07ADE0F-BE3B-F470-A6E6-1559CA203B87}"/>
+              </a:ext>
+            </a:extLst>
+          </p:cNvPr>
+          <p:cNvSpPr>
+            <a:spLocks noGrp="1"/>
+          </p:cNvSpPr>
+          <p:nvPr>
+            <p:ph type="title"/>
+          </p:nvPr>
+        </p:nvSpPr>
+        <p:spPr>
+          <a:xfrm>
+            <a:off x="838200" y="3429000"/>
+            <a:ext cx="10515600" cy="1325563"/>
+          </a:xfrm>
+        </p:spPr>
+        <p:txBody>
+          <a:bodyPr/>
+          <a:lstStyle/>
+          <a:p>
+            <a:r>
+              <a:rPr lang="it-IT" sz="6600" dirty="0">
+                <a:latin typeface="+mn-lt"/>
+              </a:rPr>
+              <a:t>I&amp;T</a:t>
+            </a:r>
+            <a:endParaRPr lang="it-IT" dirty="0">
+              <a:latin typeface="+mn-lt"/>
+            </a:endParaRPr>
+          </a:p>
+        </p:txBody>
+      </p:sp>
+      <p:pic>
+        <p:nvPicPr>
+          <p:cNvPr id="7" name="Picture 6">
+            <a:extLst>
+              <a:ext uri="{FF2B5EF4-FFF2-40B4-BE49-F238E27FC236}">
+                <a16:creationId xmlns:a16="http://schemas.microsoft.com/office/drawing/2014/main" id="{29DC972E-06B5-ADA8-A99A-302A04F6C466}"/>
+              </a:ext>
+            </a:extLst>
+          </p:cNvPr>
+          <p:cNvPicPr>
+            <a:picLocks noChangeAspect="1"/>
+          </p:cNvPicPr>
+          <p:nvPr/>
+        </p:nvPicPr>
+        <p:blipFill>
+          <a:blip r:embed="rId2"/>
+          <a:stretch>
+            <a:fillRect/>
+          </a:stretch>
+        </p:blipFill>
+        <p:spPr>
+          <a:xfrm>
+            <a:off x="4367719" y="5913038"/>
+            <a:ext cx="3754877" cy="944962"/>
+          </a:xfrm>
+          <a:prstGeom prst="rect">
+            <a:avLst/>
+          </a:prstGeom>
+        </p:spPr>
+      </p:pic>
+    </p:spTree>
+    <p:extLst>
+      <p:ext uri="{BB962C8B-B14F-4D97-AF65-F5344CB8AC3E}">
+        <p14:creationId xmlns:p14="http://schemas.microsoft.com/office/powerpoint/2010/main" val="2307764748"/>
+      </p:ext>
+    </p:extLst>
+  </p:cSld>
+  <p:clrMapOvr>
+    <a:masterClrMapping/>
+  </p:clrMapOvr>
+</p:sld>
+</file>
+
+<file path=ppt/slides/slide15.xml><?xml version="1.0" encoding="utf-8"?>
 <p:sld xmlns:a="http://schemas.openxmlformats.org/drawingml/2006/main" xmlns:r="http://schemas.openxmlformats.org/officeDocument/2006/relationships" xmlns:p="http://schemas.openxmlformats.org/presentationml/2006/main">
   <p:cSld>
     <p:spTree>
@@ -2250,8 +2911,8 @@
         </p:nvSpPr>
         <p:spPr>
           <a:xfrm>
-            <a:off x="689298" y="1449109"/>
-            <a:ext cx="10218188" cy="4401205"/>
+            <a:off x="689297" y="1449109"/>
+            <a:ext cx="10666057" cy="3693319"/>
           </a:xfrm>
           <a:prstGeom prst="rect">
             <a:avLst/>
@@ -2266,21 +2927,21 @@
           <a:p>
             <a:pPr algn="l"/>
             <a:r>
-              <a:rPr lang="en-GB" sz="2000" b="0" i="0" dirty="0">
+              <a:rPr lang="en-GB" b="0" i="0" dirty="0">
                 <a:effectLst/>
                 <a:latin typeface="Söhne"/>
               </a:rPr>
-              <a:t>We were asked to provide the implementation of some of the product functions of the application, </a:t>
-            </a:r>
-            <a:r>
-              <a:rPr lang="en-GB" sz="2000" b="1" i="0" dirty="0">
+              <a:t>We were asked to provide partial implementation of the application, </a:t>
+            </a:r>
+            <a:r>
+              <a:rPr lang="en-GB" b="1" i="0" dirty="0">
                 <a:effectLst/>
                 <a:latin typeface="Söhne"/>
               </a:rPr>
               <a:t>ignoring the gamification aspects</a:t>
             </a:r>
             <a:r>
-              <a:rPr lang="en-GB" sz="2000" b="0" i="0" dirty="0">
+              <a:rPr lang="en-GB" b="0" i="0" dirty="0">
                 <a:effectLst/>
                 <a:latin typeface="Söhne"/>
               </a:rPr>
@@ -2289,7 +2950,7 @@
           </a:p>
           <a:p>
             <a:pPr algn="l"/>
-            <a:endParaRPr lang="en-GB" sz="2000" b="0" i="0" dirty="0">
+            <a:endParaRPr lang="en-GB" b="0" i="0" dirty="0">
               <a:effectLst/>
               <a:latin typeface="Söhne"/>
             </a:endParaRPr>
@@ -2297,21 +2958,21 @@
           <a:p>
             <a:pPr algn="l"/>
             <a:r>
-              <a:rPr lang="en-GB" sz="2000" b="0" i="0" dirty="0">
+              <a:rPr lang="en-GB" b="0" i="0" dirty="0">
                 <a:effectLst/>
                 <a:latin typeface="Söhne"/>
               </a:rPr>
-              <a:t>In the end, we decided to provide the </a:t>
-            </a:r>
-            <a:r>
-              <a:rPr lang="en-GB" sz="2000" b="1" i="0" dirty="0">
+              <a:t>We provide the </a:t>
+            </a:r>
+            <a:r>
+              <a:rPr lang="en-GB" b="1" i="0" dirty="0">
                 <a:effectLst/>
                 <a:latin typeface="Söhne"/>
               </a:rPr>
-              <a:t>implementation of almost all the product functions and requirements </a:t>
-            </a:r>
-            <a:r>
-              <a:rPr lang="en-GB" sz="2000" b="0" i="0" dirty="0">
+              <a:t>implementation of almost all the product functions </a:t>
+            </a:r>
+            <a:r>
+              <a:rPr lang="en-GB" b="0" i="0" dirty="0">
                 <a:effectLst/>
                 <a:latin typeface="Söhne"/>
               </a:rPr>
@@ -2320,14 +2981,14 @@
           </a:p>
           <a:p>
             <a:pPr algn="l"/>
-            <a:endParaRPr lang="en-GB" sz="2000" dirty="0">
+            <a:endParaRPr lang="en-GB" dirty="0">
               <a:latin typeface="Söhne"/>
             </a:endParaRPr>
           </a:p>
           <a:p>
             <a:pPr algn="l"/>
             <a:r>
-              <a:rPr lang="en-GB" sz="2000" b="0" i="0" dirty="0">
+              <a:rPr lang="en-GB" b="0" i="0" dirty="0">
                 <a:effectLst/>
                 <a:latin typeface="Söhne"/>
               </a:rPr>
@@ -2336,7 +2997,7 @@
           </a:p>
           <a:p>
             <a:pPr algn="l"/>
-            <a:endParaRPr lang="en-GB" sz="2000" dirty="0">
+            <a:endParaRPr lang="en-GB" dirty="0">
               <a:latin typeface="Söhne"/>
             </a:endParaRPr>
           </a:p>
@@ -2345,36 +3006,36 @@
               <a:buAutoNum type="arabicPeriod"/>
             </a:pPr>
             <a:r>
-              <a:rPr lang="en-GB" sz="2000" b="0" i="0" dirty="0">
+              <a:rPr lang="en-GB" b="0" i="0" dirty="0">
                 <a:effectLst/>
                 <a:latin typeface="Söhne"/>
               </a:rPr>
               <a:t>The </a:t>
             </a:r>
             <a:r>
-              <a:rPr lang="en-GB" sz="2000" b="1" i="0" dirty="0">
+              <a:rPr lang="en-GB" b="1" i="0" dirty="0">
                 <a:effectLst/>
                 <a:latin typeface="Söhne"/>
               </a:rPr>
               <a:t>automated evaluation</a:t>
             </a:r>
             <a:r>
-              <a:rPr lang="en-GB" sz="2000" b="0" i="0" dirty="0">
+              <a:rPr lang="en-GB" b="0" i="0" dirty="0">
                 <a:effectLst/>
                 <a:latin typeface="Söhne"/>
               </a:rPr>
               <a:t>. </a:t>
             </a:r>
             <a:r>
-              <a:rPr lang="en-GB" sz="2000" dirty="0"/>
+              <a:rPr lang="en-GB" dirty="0"/>
               <a:t>The prototype offers automated functional evaluation exclusively for Java programs and does not implement </a:t>
             </a:r>
             <a:r>
-              <a:rPr lang="en-GB" sz="2000" b="1" dirty="0"/>
+              <a:rPr lang="en-GB" b="1" dirty="0"/>
               <a:t>static analysis</a:t>
             </a:r>
             <a:r>
-              <a:rPr lang="en-GB" sz="2000" dirty="0"/>
+              <a:rPr lang="en-GB" dirty="0"/>
               <a:t>. </a:t>
             </a:r>
           </a:p>
@@ -2382,7 +3043,7 @@
             <a:pPr marL="457200" indent="-457200" algn="l">
               <a:buAutoNum type="arabicPeriod"/>
             </a:pPr>
-            <a:endParaRPr lang="en-GB" sz="2000" b="0" i="0" dirty="0">
+            <a:endParaRPr lang="en-GB" b="0" i="0" dirty="0">
               <a:effectLst/>
               <a:latin typeface="Söhne"/>
             </a:endParaRPr>
@@ -2392,44 +3053,88 @@
               <a:buAutoNum type="arabicPeriod"/>
             </a:pPr>
             <a:r>
-              <a:rPr lang="en-GB" sz="2000" b="0" i="0" dirty="0">
+              <a:rPr lang="en-GB" b="0" i="0" dirty="0">
                 <a:effectLst/>
                 <a:latin typeface="Söhne"/>
               </a:rPr>
               <a:t>The </a:t>
             </a:r>
             <a:r>
-              <a:rPr lang="en-GB" sz="2000" b="1" i="0" dirty="0">
+              <a:rPr lang="en-GB" b="1" i="0" dirty="0">
                 <a:effectLst/>
                 <a:latin typeface="Söhne"/>
               </a:rPr>
               <a:t>manual </a:t>
             </a:r>
             <a:r>
-              <a:rPr lang="en-GB" sz="2000" b="1" dirty="0">
+              <a:rPr lang="en-GB" b="1" dirty="0">
                 <a:latin typeface="Söhne"/>
               </a:rPr>
               <a:t>optional evaluation</a:t>
             </a:r>
             <a:r>
-              <a:rPr lang="en-GB" sz="2000" dirty="0">
+              <a:rPr lang="en-GB" dirty="0">
                 <a:latin typeface="Söhne"/>
               </a:rPr>
               <a:t>. The prototype only implements the backend method to handle the HTTP request. The </a:t>
             </a:r>
             <a:r>
-              <a:rPr lang="en-GB" sz="2000" b="1" dirty="0">
+              <a:rPr lang="en-GB" b="1" dirty="0">
                 <a:latin typeface="Söhne"/>
               </a:rPr>
               <a:t>frontend</a:t>
             </a:r>
             <a:r>
-              <a:rPr lang="en-GB" sz="2000" dirty="0">
+              <a:rPr lang="en-GB" dirty="0">
                 <a:latin typeface="Söhne"/>
               </a:rPr>
               <a:t> does not let the User perform the manual optional evaluation although.</a:t>
             </a:r>
-            <a:endParaRPr lang="en-GB" sz="2000" b="0" i="0" dirty="0">
+          </a:p>
+          <a:p>
+            <a:pPr marL="457200" indent="-457200" algn="l">
+              <a:buAutoNum type="arabicPeriod"/>
+            </a:pPr>
+            <a:endParaRPr lang="en-GB" b="0" i="0" dirty="0">
+              <a:effectLst/>
+              <a:latin typeface="Söhne"/>
+            </a:endParaRPr>
+          </a:p>
+          <a:p>
+            <a:pPr marL="457200" indent="-457200" algn="l">
+              <a:buAutoNum type="arabicPeriod"/>
+            </a:pPr>
+            <a:r>
+              <a:rPr lang="en-GB" dirty="0">
+                <a:latin typeface="Söhne"/>
+              </a:rPr>
+              <a:t>The </a:t>
+            </a:r>
+            <a:r>
+              <a:rPr lang="en-GB" b="1" dirty="0">
+                <a:latin typeface="Söhne"/>
+              </a:rPr>
+              <a:t>Battles closure</a:t>
+            </a:r>
+            <a:r>
+              <a:rPr lang="en-GB" dirty="0">
+                <a:latin typeface="Söhne"/>
+              </a:rPr>
+              <a:t>. The </a:t>
+            </a:r>
+            <a:r>
+              <a:rPr lang="en-GB" b="1" dirty="0">
+                <a:latin typeface="Söhne"/>
+              </a:rPr>
+              <a:t>frontend</a:t>
+            </a:r>
+            <a:r>
+              <a:rPr lang="en-GB" dirty="0">
+                <a:latin typeface="Söhne"/>
+              </a:rPr>
+              <a:t> does not let the User close a Battle.</a:t>
+            </a:r>
+            <a:endParaRPr lang="en-GB" b="0" i="0" dirty="0">
               <a:effectLst/>
               <a:latin typeface="Söhne"/>
             </a:endParaRPr>
@@ -2449,7 +3154,7 @@
 </p:sld>
 </file>
 
-<file path=ppt/slides/slide12.xml><?xml version="1.0" encoding="utf-8"?>
+<file path=ppt/slides/slide16.xml><?xml version="1.0" encoding="utf-8"?>
 <p:sld xmlns:a="http://schemas.openxmlformats.org/drawingml/2006/main" xmlns:r="http://schemas.openxmlformats.org/officeDocument/2006/relationships" xmlns:p="http://schemas.openxmlformats.org/presentationml/2006/main">
   <p:cSld>
     <p:spTree>
@@ -2457,7 +3162,7 @@
         <p:cNvPr id="1" name="">
           <a:extLst>
             <a:ext uri="{FF2B5EF4-FFF2-40B4-BE49-F238E27FC236}">
-              <a16:creationId xmlns:a16="http://schemas.microsoft.com/office/drawing/2014/main" id="{A6F3B979-F9D3-4B35-C6DB-52CE38FBDF68}"/>
+              <a16:creationId xmlns:a16="http://schemas.microsoft.com/office/drawing/2014/main" id="{1B2F9790-C478-A491-C247-8ADEDB30D36D}"/>
             </a:ext>
           </a:extLst>
         </p:cNvPr>
@@ -2477,7 +3182,7 @@
           <p:cNvPr id="3" name="Title 2">
             <a:extLst>
               <a:ext uri="{FF2B5EF4-FFF2-40B4-BE49-F238E27FC236}">
-                <a16:creationId xmlns:a16="http://schemas.microsoft.com/office/drawing/2014/main" id="{4BC5151D-2577-C737-D2C5-D33522539F69}"/>
+                <a16:creationId xmlns:a16="http://schemas.microsoft.com/office/drawing/2014/main" id="{A83B037F-1D16-353F-174E-988D5E682180}"/>
               </a:ext>
             </a:extLst>
           </p:cNvPr>
@@ -2515,7 +3220,7 @@
           <p:cNvPr id="2" name="TextBox 1">
             <a:extLst>
               <a:ext uri="{FF2B5EF4-FFF2-40B4-BE49-F238E27FC236}">
-                <a16:creationId xmlns:a16="http://schemas.microsoft.com/office/drawing/2014/main" id="{7C1B79E4-80C6-669A-D06B-7B28DE647F75}"/>
+                <a16:creationId xmlns:a16="http://schemas.microsoft.com/office/drawing/2014/main" id="{DC43809C-1E17-D6BE-073C-83D118C73DD7}"/>
               </a:ext>
             </a:extLst>
           </p:cNvPr>
@@ -2525,7 +3230,7 @@
         <p:spPr>
           <a:xfrm>
             <a:off x="689298" y="1449109"/>
-            <a:ext cx="8464033" cy="1015663"/>
+            <a:ext cx="8464033" cy="2323713"/>
           </a:xfrm>
           <a:prstGeom prst="rect">
             <a:avLst/>
@@ -2538,33 +3243,42 @@
           </a:bodyPr>
           <a:lstStyle/>
           <a:p>
+            <a:r>
+              <a:rPr lang="en-GB" sz="2000" dirty="0">
+                <a:latin typeface="Söhne"/>
+              </a:rPr>
+              <a:t>For the frontend we used:</a:t>
+            </a:r>
+          </a:p>
+          <a:p>
             <a:pPr marL="457200" indent="-457200">
               <a:buFontTx/>
               <a:buAutoNum type="arabicPeriod"/>
             </a:pPr>
-            <a:r>
-              <a:rPr lang="en-GB" sz="2000" b="1" i="0" dirty="0">
-                <a:effectLst/>
-                <a:latin typeface="Söhne"/>
-              </a:rPr>
-              <a:t>Java Spring </a:t>
-            </a:r>
-            <a:r>
-              <a:rPr lang="en-GB" sz="2000" i="0" dirty="0">
-                <a:effectLst/>
-                <a:latin typeface="Söhne"/>
-              </a:rPr>
-              <a:t>to handle the HTTP requests.</a:t>
-            </a:r>
             <a:endParaRPr lang="en-GB" sz="2000" b="1" i="0" dirty="0">
               <a:effectLst/>
               <a:latin typeface="Söhne"/>
             </a:endParaRPr>
           </a:p>
           <a:p>
-            <a:pPr marL="457200" indent="-457200" algn="l">
+            <a:pPr marL="457200" indent="-457200">
+              <a:buFontTx/>
               <a:buAutoNum type="arabicPeriod"/>
             </a:pPr>
+            <a:r>
+              <a:rPr lang="en-GB" sz="2000" b="1" i="0" dirty="0">
+                <a:effectLst/>
+                <a:latin typeface="Söhne"/>
+              </a:rPr>
+              <a:t>Spring Framework </a:t>
+            </a:r>
+            <a:r>
+              <a:rPr lang="en-GB" sz="2000" i="0" dirty="0">
+                <a:effectLst/>
+                <a:latin typeface="Söhne"/>
+              </a:rPr>
+              <a:t>to handle the HTTP requests.</a:t>
+            </a:r>
             <a:endParaRPr lang="en-GB" sz="2000" b="1" i="0" dirty="0">
               <a:effectLst/>
               <a:latin typeface="Söhne"/>
@@ -2574,6 +3288,18 @@
             <a:pPr marL="457200" indent="-457200" algn="l">
               <a:buAutoNum type="arabicPeriod"/>
             </a:pPr>
+            <a:endParaRPr lang="en-GB" sz="2000" b="1" i="0" dirty="0">
+              <a:effectLst/>
+              <a:latin typeface="Söhne"/>
+            </a:endParaRPr>
+          </a:p>
+          <a:p>
+            <a:pPr marL="457200" indent="-457200" algn="l">
+              <a:spcAft>
+                <a:spcPts val="600"/>
+              </a:spcAft>
+              <a:buAutoNum type="arabicPeriod"/>
+            </a:pPr>
             <a:r>
               <a:rPr lang="en-GB" sz="2000" b="1" i="0" dirty="0">
                 <a:effectLst/>
@@ -2588,13 +3314,41 @@
               </a:rPr>
               <a:t>for the User Interface.</a:t>
             </a:r>
+          </a:p>
+          <a:p>
+            <a:pPr marL="914400" lvl="1" indent="-457200">
+              <a:buAutoNum type="romanUcPeriod"/>
+            </a:pPr>
+            <a:r>
+              <a:rPr lang="en-GB" sz="2000" i="0" dirty="0">
+                <a:effectLst/>
+                <a:latin typeface="Söhne"/>
+              </a:rPr>
+              <a:t>JSX</a:t>
+            </a:r>
+          </a:p>
+          <a:p>
+            <a:pPr marL="971550" lvl="1" indent="-514350">
+              <a:buFont typeface="+mj-lt"/>
+              <a:buAutoNum type="romanUcPeriod"/>
+            </a:pPr>
+            <a:r>
+              <a:rPr lang="en-GB" sz="2000" dirty="0">
+                <a:latin typeface="Söhne"/>
+              </a:rPr>
+              <a:t>Vite.js</a:t>
+            </a:r>
+            <a:endParaRPr lang="en-GB" sz="2000" i="0" dirty="0">
+              <a:effectLst/>
+              <a:latin typeface="Söhne"/>
+            </a:endParaRPr>
           </a:p>
         </p:txBody>
       </p:sp>
     </p:spTree>
     <p:extLst>
       <p:ext uri="{BB962C8B-B14F-4D97-AF65-F5344CB8AC3E}">
-        <p14:creationId xmlns:p14="http://schemas.microsoft.com/office/powerpoint/2010/main" val="4057039856"/>
+        <p14:creationId xmlns:p14="http://schemas.microsoft.com/office/powerpoint/2010/main" val="1557913134"/>
       </p:ext>
     </p:extLst>
   </p:cSld>
@@ -2604,7 +3358,7 @@
 </p:sld>
 </file>
 
-<file path=ppt/slides/slide13.xml><?xml version="1.0" encoding="utf-8"?>
+<file path=ppt/slides/slide17.xml><?xml version="1.0" encoding="utf-8"?>
 <p:sld xmlns:a="http://schemas.openxmlformats.org/drawingml/2006/main" xmlns:r="http://schemas.openxmlformats.org/officeDocument/2006/relationships" xmlns:p="http://schemas.openxmlformats.org/presentationml/2006/main">
   <p:cSld>
     <p:spTree>
@@ -2691,7 +3445,7 @@
         <p:spPr>
           <a:xfrm>
             <a:off x="689298" y="1449109"/>
-            <a:ext cx="8464033" cy="1938992"/>
+            <a:ext cx="8464033" cy="3247043"/>
           </a:xfrm>
           <a:prstGeom prst="rect">
             <a:avLst/>
@@ -2704,7 +3458,26 @@
           </a:bodyPr>
           <a:lstStyle/>
           <a:p>
+            <a:pPr algn="l"/>
+            <a:r>
+              <a:rPr lang="en-GB" sz="2000" i="0" dirty="0">
+                <a:effectLst/>
+                <a:latin typeface="Söhne"/>
+              </a:rPr>
+              <a:t>For the backend we used:</a:t>
+            </a:r>
+          </a:p>
+          <a:p>
+            <a:pPr algn="l"/>
+            <a:endParaRPr lang="en-GB" sz="2000" b="1" dirty="0">
+              <a:latin typeface="Söhne"/>
+            </a:endParaRPr>
+          </a:p>
+          <a:p>
             <a:pPr marL="457200" indent="-457200" algn="l">
+              <a:spcAft>
+                <a:spcPts val="600"/>
+              </a:spcAft>
               <a:buAutoNum type="arabicPeriod"/>
             </a:pPr>
             <a:r>
@@ -2712,7 +3485,7 @@
                 <a:effectLst/>
                 <a:latin typeface="Söhne"/>
               </a:rPr>
-              <a:t>Java Spring </a:t>
+              <a:t>Spring Framework </a:t>
             </a:r>
             <a:r>
               <a:rPr lang="en-GB" sz="2000" i="0" dirty="0">
@@ -2721,7 +3494,54 @@
               </a:rPr>
               <a:t>to implement the business logic.</a:t>
             </a:r>
-            <a:endParaRPr lang="en-GB" sz="2000" b="1" i="0" dirty="0">
+            <a:endParaRPr lang="en-GB" sz="2000" dirty="0">
+              <a:latin typeface="Söhne"/>
+            </a:endParaRPr>
+          </a:p>
+          <a:p>
+            <a:pPr marL="971550" lvl="1" indent="-514350">
+              <a:buFont typeface="+mj-lt"/>
+              <a:buAutoNum type="romanUcPeriod"/>
+            </a:pPr>
+            <a:r>
+              <a:rPr lang="en-GB" sz="2000" i="0" dirty="0">
+                <a:effectLst/>
+                <a:latin typeface="Söhne"/>
+              </a:rPr>
+              <a:t>Spring security for simplifying authorization</a:t>
+            </a:r>
+          </a:p>
+          <a:p>
+            <a:pPr marL="971550" lvl="1" indent="-514350">
+              <a:buFont typeface="+mj-lt"/>
+              <a:buAutoNum type="romanUcPeriod"/>
+            </a:pPr>
+            <a:r>
+              <a:rPr lang="en-GB" sz="2000" dirty="0">
+                <a:latin typeface="Söhne"/>
+              </a:rPr>
+              <a:t>Spring data for simplifying data access</a:t>
+            </a:r>
+          </a:p>
+          <a:p>
+            <a:pPr marL="971550" lvl="1" indent="-514350">
+              <a:buFont typeface="+mj-lt"/>
+              <a:buAutoNum type="romanUcPeriod"/>
+            </a:pPr>
+            <a:r>
+              <a:rPr lang="en-GB" sz="2000" i="0" dirty="0">
+                <a:effectLst/>
+                <a:latin typeface="Söhne"/>
+              </a:rPr>
+              <a:t>Spring vali</a:t>
+            </a:r>
+            <a:r>
+              <a:rPr lang="en-GB" sz="2000" dirty="0">
+                <a:latin typeface="Söhne"/>
+              </a:rPr>
+              <a:t>dation for simplifying integrity checks</a:t>
+            </a:r>
+            <a:endParaRPr lang="en-GB" sz="2000" i="0" dirty="0">
               <a:effectLst/>
               <a:latin typeface="Söhne"/>
             </a:endParaRPr>
@@ -2771,7 +3591,7 @@
             <a:pPr marL="457200" indent="-457200" algn="l">
               <a:buAutoNum type="arabicPeriod"/>
             </a:pPr>
-            <a:endParaRPr lang="en-GB" sz="2000" b="1" dirty="0">
+            <a:endParaRPr lang="en-GB" sz="2000" dirty="0">
               <a:latin typeface="Söhne"/>
             </a:endParaRPr>
           </a:p>
@@ -2784,24 +3604,30 @@
                 <a:effectLst/>
                 <a:latin typeface="Söhne"/>
               </a:rPr>
-              <a:t>Java Database Connectivity (JDBC) </a:t>
+              <a:t>Mockito, JUnit </a:t>
             </a:r>
             <a:r>
               <a:rPr lang="en-GB" sz="2000" i="0" dirty="0">
                 <a:effectLst/>
                 <a:latin typeface="Söhne"/>
               </a:rPr>
-              <a:t>for connectivity.</a:t>
-            </a:r>
-            <a:endParaRPr lang="en-GB" sz="2000" b="1" dirty="0">
-              <a:latin typeface="Söhne"/>
-            </a:endParaRPr>
-          </a:p>
-          <a:p>
-            <a:pPr marL="457200" indent="-457200" algn="l">
-              <a:buAutoNum type="arabicPeriod"/>
-            </a:pPr>
-            <a:endParaRPr lang="en-GB" sz="2000" b="0" i="0" dirty="0">
+              <a:t>and</a:t>
+            </a:r>
+            <a:r>
+              <a:rPr lang="en-GB" sz="2000" b="1" i="0" dirty="0">
+                <a:effectLst/>
+                <a:latin typeface="Söhne"/>
+              </a:rPr>
+              <a:t> Postman </a:t>
+            </a:r>
+            <a:r>
+              <a:rPr lang="en-GB" sz="2000" i="0" dirty="0">
+                <a:effectLst/>
+                <a:latin typeface="Söhne"/>
+              </a:rPr>
+              <a:t>for testing.</a:t>
+            </a:r>
+            <a:endParaRPr lang="en-GB" sz="2000" b="1" i="0" dirty="0">
               <a:effectLst/>
               <a:latin typeface="Söhne"/>
             </a:endParaRPr>
@@ -2821,176 +3647,7 @@
 </p:sld>
 </file>
 
-<file path=ppt/slides/slide14.xml><?xml version="1.0" encoding="utf-8"?>
-<p:sld xmlns:a="http://schemas.openxmlformats.org/drawingml/2006/main" xmlns:r="http://schemas.openxmlformats.org/officeDocument/2006/relationships" xmlns:p="http://schemas.openxmlformats.org/presentationml/2006/main">
-  <p:cSld>
-    <p:spTree>
-      <p:nvGrpSpPr>
-        <p:cNvPr id="1" name="">
-          <a:extLst>
-            <a:ext uri="{FF2B5EF4-FFF2-40B4-BE49-F238E27FC236}">
-              <a16:creationId xmlns:a16="http://schemas.microsoft.com/office/drawing/2014/main" id="{1B2F9790-C478-A491-C247-8ADEDB30D36D}"/>
-            </a:ext>
-          </a:extLst>
-        </p:cNvPr>
-        <p:cNvGrpSpPr/>
-        <p:nvPr/>
-      </p:nvGrpSpPr>
-      <p:grpSpPr>
-        <a:xfrm>
-          <a:off x="0" y="0"/>
-          <a:ext cx="0" cy="0"/>
-          <a:chOff x="0" y="0"/>
-          <a:chExt cx="0" cy="0"/>
-        </a:xfrm>
-      </p:grpSpPr>
-      <p:sp>
-        <p:nvSpPr>
-          <p:cNvPr id="3" name="Title 2">
-            <a:extLst>
-              <a:ext uri="{FF2B5EF4-FFF2-40B4-BE49-F238E27FC236}">
-                <a16:creationId xmlns:a16="http://schemas.microsoft.com/office/drawing/2014/main" id="{A83B037F-1D16-353F-174E-988D5E682180}"/>
-              </a:ext>
-            </a:extLst>
-          </p:cNvPr>
-          <p:cNvSpPr>
-            <a:spLocks noGrp="1"/>
-          </p:cNvSpPr>
-          <p:nvPr>
-            <p:ph type="title"/>
-          </p:nvPr>
-        </p:nvSpPr>
-        <p:spPr>
-          <a:xfrm>
-            <a:off x="254645" y="137270"/>
-            <a:ext cx="6971271" cy="543697"/>
-          </a:xfrm>
-        </p:spPr>
-        <p:txBody>
-          <a:bodyPr>
-            <a:normAutofit/>
-          </a:bodyPr>
-          <a:lstStyle/>
-          <a:p>
-            <a:r>
-              <a:rPr lang="it-IT" dirty="0">
-                <a:latin typeface="Verdana" panose="020B0604030504040204" pitchFamily="34" charset="0"/>
-                <a:ea typeface="Verdana" panose="020B0604030504040204" pitchFamily="34" charset="0"/>
-              </a:rPr>
-              <a:t>ITD - Frontend</a:t>
-            </a:r>
-          </a:p>
-        </p:txBody>
-      </p:sp>
-      <p:sp>
-        <p:nvSpPr>
-          <p:cNvPr id="2" name="TextBox 1">
-            <a:extLst>
-              <a:ext uri="{FF2B5EF4-FFF2-40B4-BE49-F238E27FC236}">
-                <a16:creationId xmlns:a16="http://schemas.microsoft.com/office/drawing/2014/main" id="{DC43809C-1E17-D6BE-073C-83D118C73DD7}"/>
-              </a:ext>
-            </a:extLst>
-          </p:cNvPr>
-          <p:cNvSpPr txBox="1"/>
-          <p:nvPr/>
-        </p:nvSpPr>
-        <p:spPr>
-          <a:xfrm>
-            <a:off x="689298" y="1449109"/>
-            <a:ext cx="8464033" cy="1015663"/>
-          </a:xfrm>
-          <a:prstGeom prst="rect">
-            <a:avLst/>
-          </a:prstGeom>
-          <a:noFill/>
-        </p:spPr>
-        <p:txBody>
-          <a:bodyPr wrap="square">
-            <a:spAutoFit/>
-          </a:bodyPr>
-          <a:lstStyle/>
-          <a:p>
-            <a:pPr marL="457200" indent="-457200">
-              <a:buFontTx/>
-              <a:buAutoNum type="arabicPeriod"/>
-            </a:pPr>
-            <a:r>
-              <a:rPr lang="en-GB" sz="2000" b="1" i="0" dirty="0">
-                <a:effectLst/>
-                <a:latin typeface="Söhne"/>
-              </a:rPr>
-              <a:t>Java Spring </a:t>
-            </a:r>
-            <a:r>
-              <a:rPr lang="en-GB" sz="2000" i="0" dirty="0">
-                <a:effectLst/>
-                <a:latin typeface="Söhne"/>
-              </a:rPr>
-              <a:t>to handle the HTTP requests.</a:t>
-            </a:r>
-            <a:endParaRPr lang="en-GB" sz="2000" b="1" i="0" dirty="0">
-              <a:effectLst/>
-              <a:latin typeface="Söhne"/>
-            </a:endParaRPr>
-          </a:p>
-          <a:p>
-            <a:pPr marL="457200" indent="-457200" algn="l">
-              <a:buAutoNum type="arabicPeriod"/>
-            </a:pPr>
-            <a:endParaRPr lang="en-GB" sz="2000" b="1" i="0" dirty="0">
-              <a:effectLst/>
-              <a:latin typeface="Söhne"/>
-            </a:endParaRPr>
-          </a:p>
-          <a:p>
-            <a:pPr marL="457200" indent="-457200" algn="l">
-              <a:buAutoNum type="arabicPeriod"/>
-            </a:pPr>
-            <a:r>
-              <a:rPr lang="en-GB" sz="2000" b="1" i="0" dirty="0">
-                <a:effectLst/>
-                <a:latin typeface="Söhne"/>
-              </a:rPr>
-              <a:t>React </a:t>
-            </a:r>
-            <a:r>
-              <a:rPr lang="en-GB" sz="2000" i="0" dirty="0">
-                <a:effectLst/>
-                <a:latin typeface="Söhne"/>
-              </a:rPr>
-              <a:t>for the User Interface using </a:t>
-            </a:r>
-            <a:r>
-              <a:rPr lang="en-GB" sz="2000" b="1" i="0" dirty="0">
-                <a:effectLst/>
-                <a:latin typeface="Söhne"/>
-              </a:rPr>
-              <a:t>JSX</a:t>
-            </a:r>
-            <a:r>
-              <a:rPr lang="en-GB" sz="2000" i="0" dirty="0">
-                <a:effectLst/>
-                <a:latin typeface="Söhne"/>
-              </a:rPr>
-              <a:t>.</a:t>
-            </a:r>
-          </a:p>
-        </p:txBody>
-      </p:sp>
-    </p:spTree>
-    <p:extLst>
-      <p:ext uri="{BB962C8B-B14F-4D97-AF65-F5344CB8AC3E}">
-        <p14:creationId xmlns:p14="http://schemas.microsoft.com/office/powerpoint/2010/main" val="1557913134"/>
-      </p:ext>
-    </p:extLst>
-  </p:cSld>
-  <p:clrMapOvr>
-    <a:masterClrMapping/>
-  </p:clrMapOvr>
-</p:sld>
-</file>
-
-<file path=ppt/slides/slide15.xml><?xml version="1.0" encoding="utf-8"?>
+<file path=ppt/slides/slide18.xml><?xml version="1.0" encoding="utf-8"?>
 <p:sld xmlns:a="http://schemas.openxmlformats.org/drawingml/2006/main" xmlns:r="http://schemas.openxmlformats.org/officeDocument/2006/relationships" xmlns:p="http://schemas.openxmlformats.org/presentationml/2006/main">
   <p:cSld>
     <p:spTree>
@@ -3066,7 +3723,7 @@
         <p:spPr>
           <a:xfrm>
             <a:off x="689298" y="1449109"/>
-            <a:ext cx="8464033" cy="2246769"/>
+            <a:ext cx="9369102" cy="2862322"/>
           </a:xfrm>
           <a:prstGeom prst="rect">
             <a:avLst/>
@@ -3080,88 +3737,123 @@
           <a:lstStyle/>
           <a:p>
             <a:r>
-              <a:rPr lang="it-IT" sz="2000" b="1" dirty="0">
-                <a:latin typeface="Söhne"/>
-              </a:rPr>
-              <a:t>1. Java Spring Task Scheduler </a:t>
-            </a:r>
-            <a:r>
               <a:rPr lang="it-IT" sz="2000" dirty="0">
                 <a:latin typeface="Söhne"/>
               </a:rPr>
-              <a:t>to trigger transactions on the DB.</a:t>
+              <a:t>We handle the deadlines with:</a:t>
             </a:r>
           </a:p>
           <a:p>
             <a:pPr marL="457200" indent="-457200">
-              <a:buFontTx/>
               <a:buAutoNum type="arabicPeriod"/>
             </a:pPr>
-            <a:endParaRPr lang="it-IT" sz="2000" i="0" dirty="0">
-              <a:effectLst/>
+            <a:endParaRPr lang="it-IT" sz="2000" b="1" dirty="0">
               <a:latin typeface="Söhne"/>
             </a:endParaRPr>
           </a:p>
           <a:p>
-            <a:r>
-              <a:rPr lang="en-GB" sz="2000" b="1" dirty="0">
-                <a:latin typeface="Söhne"/>
-              </a:rPr>
-              <a:t>2. DB </a:t>
-            </a:r>
-            <a:r>
-              <a:rPr lang="en-GB" sz="2000" dirty="0">
-                <a:latin typeface="Söhne"/>
-              </a:rPr>
-              <a:t>for persistency.</a:t>
-            </a:r>
-          </a:p>
-          <a:p>
-            <a:endParaRPr lang="en-GB" sz="2000" i="0" dirty="0">
-              <a:effectLst/>
+            <a:pPr marL="457200" indent="-457200">
+              <a:buAutoNum type="arabicPeriod"/>
+            </a:pPr>
+            <a:r>
+              <a:rPr lang="it-IT" sz="2000" b="1" dirty="0">
+                <a:latin typeface="Söhne"/>
+              </a:rPr>
+              <a:t>Spring Task Scheduler </a:t>
+            </a:r>
+            <a:r>
+              <a:rPr lang="it-IT" sz="2000" dirty="0">
+                <a:latin typeface="Söhne"/>
+              </a:rPr>
+              <a:t>to trigger transactions on the DB.</a:t>
+            </a:r>
+          </a:p>
+          <a:p>
+            <a:pPr marL="457200" indent="-457200">
+              <a:buAutoNum type="arabicPeriod"/>
+            </a:pPr>
+            <a:endParaRPr lang="it-IT" sz="2000" b="1" dirty="0">
               <a:latin typeface="Söhne"/>
             </a:endParaRPr>
           </a:p>
           <a:p>
-            <a:r>
-              <a:rPr lang="en-GB" sz="2000" b="1" i="0" dirty="0">
-                <a:effectLst/>
-                <a:latin typeface="Söhne"/>
-              </a:rPr>
-              <a:t>3. Strategy Pattern </a:t>
-            </a:r>
-            <a:r>
-              <a:rPr lang="en-GB" sz="2000" i="0" dirty="0">
-                <a:effectLst/>
-                <a:latin typeface="Söhne"/>
-              </a:rPr>
-              <a:t>for reusability.</a:t>
-            </a:r>
-          </a:p>
-          <a:p>
-            <a:endParaRPr lang="en-GB" sz="2000" b="1" dirty="0">
-              <a:latin typeface="Söhne"/>
-            </a:endParaRPr>
-          </a:p>
-          <a:p>
-            <a:r>
-              <a:rPr lang="en-GB" sz="2000" b="1" i="0" dirty="0">
-                <a:effectLst/>
-                <a:latin typeface="Söhne"/>
-              </a:rPr>
-              <a:t>4. Spring Application Events </a:t>
-            </a:r>
-            <a:r>
-              <a:rPr lang="en-GB" sz="2000" i="0" dirty="0">
-                <a:effectLst/>
-                <a:latin typeface="Söhne"/>
-              </a:rPr>
-              <a:t>for asynchrony.</a:t>
-            </a:r>
+            <a:pPr marL="457200" indent="-457200">
+              <a:buAutoNum type="arabicPeriod"/>
+            </a:pPr>
+            <a:r>
+              <a:rPr lang="en-GB" sz="2000" b="1" dirty="0">
+                <a:latin typeface="Söhne"/>
+              </a:rPr>
+              <a:t>Deadlines are stored on the DB </a:t>
+            </a:r>
+            <a:r>
+              <a:rPr lang="en-GB" sz="2000" dirty="0">
+                <a:latin typeface="Söhne"/>
+              </a:rPr>
+              <a:t>for resiliency to system failure.</a:t>
+            </a:r>
+          </a:p>
+          <a:p>
+            <a:pPr marL="457200" indent="-457200">
+              <a:buAutoNum type="arabicPeriod"/>
+            </a:pPr>
             <a:endParaRPr lang="en-GB" sz="2000" b="1" i="0" dirty="0">
               <a:effectLst/>
               <a:latin typeface="Söhne"/>
             </a:endParaRPr>
+          </a:p>
+          <a:p>
+            <a:pPr marL="457200" indent="-457200">
+              <a:buAutoNum type="arabicPeriod"/>
+            </a:pPr>
+            <a:r>
+              <a:rPr lang="en-GB" sz="2000" b="1" i="0" dirty="0">
+                <a:effectLst/>
+                <a:latin typeface="Söhne"/>
+              </a:rPr>
+              <a:t>Strategy Pattern </a:t>
+            </a:r>
+            <a:r>
+              <a:rPr lang="en-GB" sz="2000" i="0" dirty="0">
+                <a:effectLst/>
+                <a:latin typeface="Söhne"/>
+              </a:rPr>
+              <a:t>for reusability</a:t>
+            </a:r>
+            <a:r>
+              <a:rPr lang="en-GB" sz="2000" dirty="0">
+                <a:latin typeface="Söhne"/>
+              </a:rPr>
+              <a:t>.</a:t>
+            </a:r>
+          </a:p>
+          <a:p>
+            <a:pPr marL="457200" indent="-457200">
+              <a:buAutoNum type="arabicPeriod"/>
+            </a:pPr>
+            <a:endParaRPr lang="en-GB" sz="2000" b="1" i="0" dirty="0">
+              <a:effectLst/>
+              <a:latin typeface="Söhne"/>
+            </a:endParaRPr>
+          </a:p>
+          <a:p>
+            <a:pPr marL="457200" indent="-457200">
+              <a:buAutoNum type="arabicPeriod"/>
+            </a:pPr>
+            <a:r>
+              <a:rPr lang="en-GB" sz="2000" b="1" i="0" dirty="0">
+                <a:effectLst/>
+                <a:latin typeface="Söhne"/>
+              </a:rPr>
+              <a:t>Spring Application Events </a:t>
+            </a:r>
+            <a:r>
+              <a:rPr lang="en-GB" sz="2000" i="0" dirty="0">
+                <a:effectLst/>
+                <a:latin typeface="Söhne"/>
+              </a:rPr>
+              <a:t>for asynchronous communication between threads.</a:t>
+            </a:r>
           </a:p>
         </p:txBody>
       </p:sp>
@@ -3178,7 +3870,7 @@
 </p:sld>
 </file>
 
-<file path=ppt/slides/slide16.xml><?xml version="1.0" encoding="utf-8"?>
+<file path=ppt/slides/slide19.xml><?xml version="1.0" encoding="utf-8"?>
 <p:sld xmlns:a="http://schemas.openxmlformats.org/drawingml/2006/main" xmlns:r="http://schemas.openxmlformats.org/officeDocument/2006/relationships" xmlns:p="http://schemas.openxmlformats.org/presentationml/2006/main">
   <p:cSld>
     <p:spTree>
@@ -3254,7 +3946,7 @@
         <p:spPr>
           <a:xfrm>
             <a:off x="689298" y="1449109"/>
-            <a:ext cx="8464033" cy="1631216"/>
+            <a:ext cx="8809265" cy="2246769"/>
           </a:xfrm>
           <a:prstGeom prst="rect">
             <a:avLst/>
@@ -3269,19 +3961,35 @@
           <a:p>
             <a:pPr algn="l"/>
             <a:r>
+              <a:rPr lang="en-GB" sz="2000" i="0" dirty="0">
+                <a:effectLst/>
+                <a:latin typeface="Söhne"/>
+              </a:rPr>
+              <a:t>We used</a:t>
+            </a:r>
+            <a:r>
               <a:rPr lang="en-GB" sz="2000" b="1" i="0" dirty="0">
                 <a:effectLst/>
                 <a:latin typeface="Söhne"/>
               </a:rPr>
-              <a:t>JSON Web Tokens (JWT) </a:t>
-            </a:r>
-            <a:r>
-              <a:rPr lang="en-GB" sz="2000" i="0" dirty="0">
-                <a:effectLst/>
-                <a:latin typeface="Söhne"/>
-              </a:rPr>
-              <a:t>were used for:</a:t>
-            </a:r>
+              <a:t> JSON Web Tokens (JWT)</a:t>
+            </a:r>
+            <a:r>
+              <a:rPr lang="en-GB" sz="2000" b="1" dirty="0">
+                <a:latin typeface="Söhne"/>
+              </a:rPr>
+              <a:t> </a:t>
+            </a:r>
+            <a:r>
+              <a:rPr lang="en-GB" sz="2000" dirty="0">
+                <a:latin typeface="Söhne"/>
+              </a:rPr>
+              <a:t>for:</a:t>
+            </a:r>
+            <a:endParaRPr lang="en-GB" sz="2000" i="0" dirty="0">
+              <a:effectLst/>
+              <a:latin typeface="Söhne"/>
+            </a:endParaRPr>
           </a:p>
           <a:p>
             <a:pPr algn="l"/>
@@ -3333,6 +4041,47 @@
                 <a:latin typeface="Söhne"/>
               </a:rPr>
               <a:t>Team invite links.</a:t>
+            </a:r>
+          </a:p>
+          <a:p>
+            <a:pPr marL="457200" indent="-457200" algn="l">
+              <a:buAutoNum type="arabicPeriod"/>
+            </a:pPr>
+            <a:endParaRPr lang="en-GB" sz="2000" dirty="0">
+              <a:latin typeface="Söhne"/>
+            </a:endParaRPr>
+          </a:p>
+          <a:p>
+            <a:pPr algn="l"/>
+            <a:r>
+              <a:rPr lang="en-GB" sz="2000" dirty="0">
+                <a:latin typeface="Söhne"/>
+              </a:rPr>
+              <a:t>They were generated with </a:t>
+            </a:r>
+            <a:r>
+              <a:rPr lang="en-GB" sz="2000" b="1" dirty="0">
+                <a:latin typeface="Söhne"/>
+              </a:rPr>
+              <a:t>jjwt </a:t>
+            </a:r>
+            <a:r>
+              <a:rPr lang="en-GB" sz="2000" dirty="0">
+                <a:latin typeface="Söhne"/>
+              </a:rPr>
+              <a:t>library and digitally signed with </a:t>
+            </a:r>
+            <a:r>
+              <a:rPr lang="en-GB" sz="2000" b="1" dirty="0">
+                <a:latin typeface="Söhne"/>
+              </a:rPr>
+              <a:t>2048-bit RSA keys</a:t>
+            </a:r>
+            <a:r>
+              <a:rPr lang="en-GB" sz="2000" dirty="0">
+                <a:latin typeface="Söhne"/>
+              </a:rPr>
+              <a:t>.</a:t>
             </a:r>
           </a:p>
         </p:txBody>
@@ -3350,7 +4099,282 @@
 </p:sld>
 </file>
 
-<file path=ppt/slides/slide17.xml><?xml version="1.0" encoding="utf-8"?>
+<file path=ppt/slides/slide2.xml><?xml version="1.0" encoding="utf-8"?>
+<p:sld xmlns:a="http://schemas.openxmlformats.org/drawingml/2006/main" xmlns:r="http://schemas.openxmlformats.org/officeDocument/2006/relationships" xmlns:p="http://schemas.openxmlformats.org/presentationml/2006/main">
+  <p:cSld>
+    <p:spTree>
+      <p:nvGrpSpPr>
+        <p:cNvPr id="1" name="">
+          <a:extLst>
+            <a:ext uri="{FF2B5EF4-FFF2-40B4-BE49-F238E27FC236}">
+              <a16:creationId xmlns:a16="http://schemas.microsoft.com/office/drawing/2014/main" id="{D8BE169C-7EE4-2BA9-8524-89CB1E404E05}"/>
+            </a:ext>
+          </a:extLst>
+        </p:cNvPr>
+        <p:cNvGrpSpPr/>
+        <p:nvPr/>
+      </p:nvGrpSpPr>
+      <p:grpSpPr>
+        <a:xfrm>
+          <a:off x="0" y="0"/>
+          <a:ext cx="0" cy="0"/>
+          <a:chOff x="0" y="0"/>
+          <a:chExt cx="0" cy="0"/>
+        </a:xfrm>
+      </p:grpSpPr>
+      <p:sp>
+        <p:nvSpPr>
+          <p:cNvPr id="9" name="Title 8">
+            <a:extLst>
+              <a:ext uri="{FF2B5EF4-FFF2-40B4-BE49-F238E27FC236}">
+                <a16:creationId xmlns:a16="http://schemas.microsoft.com/office/drawing/2014/main" id="{980946F5-4EC2-EC91-CDD4-603F197CA61F}"/>
+              </a:ext>
+            </a:extLst>
+          </p:cNvPr>
+          <p:cNvSpPr>
+            <a:spLocks noGrp="1"/>
+          </p:cNvSpPr>
+          <p:nvPr>
+            <p:ph type="title"/>
+          </p:nvPr>
+        </p:nvSpPr>
+        <p:spPr>
+          <a:xfrm>
+            <a:off x="838200" y="3429000"/>
+            <a:ext cx="10515600" cy="1325563"/>
+          </a:xfrm>
+        </p:spPr>
+        <p:txBody>
+          <a:bodyPr/>
+          <a:lstStyle/>
+          <a:p>
+            <a:r>
+              <a:rPr lang="it-IT" sz="6600" dirty="0">
+                <a:latin typeface="+mn-lt"/>
+              </a:rPr>
+              <a:t>RASD</a:t>
+            </a:r>
+            <a:endParaRPr lang="it-IT" dirty="0">
+              <a:latin typeface="+mn-lt"/>
+            </a:endParaRPr>
+          </a:p>
+        </p:txBody>
+      </p:sp>
+      <p:pic>
+        <p:nvPicPr>
+          <p:cNvPr id="7" name="Picture 6">
+            <a:extLst>
+              <a:ext uri="{FF2B5EF4-FFF2-40B4-BE49-F238E27FC236}">
+                <a16:creationId xmlns:a16="http://schemas.microsoft.com/office/drawing/2014/main" id="{A8D5ACB8-006E-D8C7-DBA7-802DD90D35A1}"/>
+              </a:ext>
+            </a:extLst>
+          </p:cNvPr>
+          <p:cNvPicPr>
+            <a:picLocks noChangeAspect="1"/>
+          </p:cNvPicPr>
+          <p:nvPr/>
+        </p:nvPicPr>
+        <p:blipFill>
+          <a:blip r:embed="rId2"/>
+          <a:stretch>
+            <a:fillRect/>
+          </a:stretch>
+        </p:blipFill>
+        <p:spPr>
+          <a:xfrm>
+            <a:off x="4367719" y="5913038"/>
+            <a:ext cx="3754877" cy="944962"/>
+          </a:xfrm>
+          <a:prstGeom prst="rect">
+            <a:avLst/>
+          </a:prstGeom>
+        </p:spPr>
+      </p:pic>
+    </p:spTree>
+    <p:extLst>
+      <p:ext uri="{BB962C8B-B14F-4D97-AF65-F5344CB8AC3E}">
+        <p14:creationId xmlns:p14="http://schemas.microsoft.com/office/powerpoint/2010/main" val="1229890500"/>
+      </p:ext>
+    </p:extLst>
+  </p:cSld>
+  <p:clrMapOvr>
+    <a:masterClrMapping/>
+  </p:clrMapOvr>
+</p:sld>
+</file>
+
+<file path=ppt/slides/slide20.xml><?xml version="1.0" encoding="utf-8"?>
+<p:sld xmlns:a="http://schemas.openxmlformats.org/drawingml/2006/main" xmlns:r="http://schemas.openxmlformats.org/officeDocument/2006/relationships" xmlns:p="http://schemas.openxmlformats.org/presentationml/2006/main">
+  <p:cSld>
+    <p:spTree>
+      <p:nvGrpSpPr>
+        <p:cNvPr id="1" name="">
+          <a:extLst>
+            <a:ext uri="{FF2B5EF4-FFF2-40B4-BE49-F238E27FC236}">
+              <a16:creationId xmlns:a16="http://schemas.microsoft.com/office/drawing/2014/main" id="{26CAC7F0-464C-50CA-05D3-AE35313EC39F}"/>
+            </a:ext>
+          </a:extLst>
+        </p:cNvPr>
+        <p:cNvGrpSpPr/>
+        <p:nvPr/>
+      </p:nvGrpSpPr>
+      <p:grpSpPr>
+        <a:xfrm>
+          <a:off x="0" y="0"/>
+          <a:ext cx="0" cy="0"/>
+          <a:chOff x="0" y="0"/>
+          <a:chExt cx="0" cy="0"/>
+        </a:xfrm>
+      </p:grpSpPr>
+      <p:sp>
+        <p:nvSpPr>
+          <p:cNvPr id="3" name="Title 2">
+            <a:extLst>
+              <a:ext uri="{FF2B5EF4-FFF2-40B4-BE49-F238E27FC236}">
+                <a16:creationId xmlns:a16="http://schemas.microsoft.com/office/drawing/2014/main" id="{209D0E24-A9C1-5DE7-89C4-1F8F7A1E71D9}"/>
+              </a:ext>
+            </a:extLst>
+          </p:cNvPr>
+          <p:cNvSpPr>
+            <a:spLocks noGrp="1"/>
+          </p:cNvSpPr>
+          <p:nvPr>
+            <p:ph type="title"/>
+          </p:nvPr>
+        </p:nvSpPr>
+        <p:spPr>
+          <a:xfrm>
+            <a:off x="254645" y="137270"/>
+            <a:ext cx="6971271" cy="543697"/>
+          </a:xfrm>
+        </p:spPr>
+        <p:txBody>
+          <a:bodyPr>
+            <a:normAutofit/>
+          </a:bodyPr>
+          <a:lstStyle/>
+          <a:p>
+            <a:r>
+              <a:rPr lang="it-IT" dirty="0">
+                <a:latin typeface="Verdana" panose="020B0604030504040204" pitchFamily="34" charset="0"/>
+                <a:ea typeface="Verdana" panose="020B0604030504040204" pitchFamily="34" charset="0"/>
+              </a:rPr>
+              <a:t>ITD - Interacting with GitHub</a:t>
+            </a:r>
+          </a:p>
+        </p:txBody>
+      </p:sp>
+      <p:sp>
+        <p:nvSpPr>
+          <p:cNvPr id="2" name="TextBox 1">
+            <a:extLst>
+              <a:ext uri="{FF2B5EF4-FFF2-40B4-BE49-F238E27FC236}">
+                <a16:creationId xmlns:a16="http://schemas.microsoft.com/office/drawing/2014/main" id="{3CFD9C49-0A8C-9AE1-7860-51CB38411043}"/>
+              </a:ext>
+            </a:extLst>
+          </p:cNvPr>
+          <p:cNvSpPr txBox="1"/>
+          <p:nvPr/>
+        </p:nvSpPr>
+        <p:spPr>
+          <a:xfrm>
+            <a:off x="689298" y="1449109"/>
+            <a:ext cx="10162204" cy="1938992"/>
+          </a:xfrm>
+          <a:prstGeom prst="rect">
+            <a:avLst/>
+          </a:prstGeom>
+          <a:noFill/>
+        </p:spPr>
+        <p:txBody>
+          <a:bodyPr wrap="square">
+            <a:spAutoFit/>
+          </a:bodyPr>
+          <a:lstStyle/>
+          <a:p>
+            <a:pPr algn="l"/>
+            <a:r>
+              <a:rPr lang="en-GB" sz="2000" dirty="0">
+                <a:latin typeface="Söhne"/>
+              </a:rPr>
+              <a:t>Two key aspects to highlight regarding our application's interactions with GitHub are:</a:t>
+            </a:r>
+          </a:p>
+          <a:p>
+            <a:pPr algn="l"/>
+            <a:endParaRPr lang="en-GB" sz="2000" dirty="0">
+              <a:latin typeface="Söhne"/>
+            </a:endParaRPr>
+          </a:p>
+          <a:p>
+            <a:pPr marL="457200" indent="-457200" algn="l">
+              <a:buAutoNum type="arabicPeriod"/>
+            </a:pPr>
+            <a:r>
+              <a:rPr lang="en-GB" sz="2000" dirty="0">
+                <a:latin typeface="Söhne"/>
+              </a:rPr>
+              <a:t>Handling repositories for Battles.</a:t>
+            </a:r>
+          </a:p>
+          <a:p>
+            <a:pPr marL="457200" indent="-457200">
+              <a:buFontTx/>
+              <a:buAutoNum type="arabicPeriod"/>
+            </a:pPr>
+            <a:r>
+              <a:rPr lang="en-GB" sz="2000" dirty="0">
+                <a:latin typeface="Söhne"/>
+              </a:rPr>
+              <a:t>Authenticating commit authors.</a:t>
+            </a:r>
+          </a:p>
+          <a:p>
+            <a:pPr algn="l"/>
+            <a:endParaRPr lang="en-GB" sz="2000" dirty="0">
+              <a:latin typeface="Söhne"/>
+            </a:endParaRPr>
+          </a:p>
+          <a:p>
+            <a:pPr algn="l"/>
+            <a:r>
+              <a:rPr lang="en-GB" sz="2000" dirty="0">
+                <a:latin typeface="Söhne"/>
+              </a:rPr>
+              <a:t>We utilized the </a:t>
+            </a:r>
+            <a:r>
+              <a:rPr lang="en-GB" sz="2000" b="1" dirty="0">
+                <a:latin typeface="Söhne"/>
+              </a:rPr>
+              <a:t>GitHub API </a:t>
+            </a:r>
+            <a:r>
+              <a:rPr lang="en-GB" sz="2000" dirty="0">
+                <a:latin typeface="Söhne"/>
+              </a:rPr>
+              <a:t>library for Java, leveraging its integration with GitHub's REST APIs.</a:t>
+            </a:r>
+            <a:endParaRPr lang="en-GB" sz="2000" b="1" dirty="0">
+              <a:latin typeface="Söhne"/>
+            </a:endParaRPr>
+          </a:p>
+        </p:txBody>
+      </p:sp>
+    </p:spTree>
+    <p:extLst>
+      <p:ext uri="{BB962C8B-B14F-4D97-AF65-F5344CB8AC3E}">
+        <p14:creationId xmlns:p14="http://schemas.microsoft.com/office/powerpoint/2010/main" val="113066631"/>
+      </p:ext>
+    </p:extLst>
+  </p:cSld>
+  <p:clrMapOvr>
+    <a:masterClrMapping/>
+  </p:clrMapOvr>
+</p:sld>
+</file>
+
+<file path=ppt/slides/slide21.xml><?xml version="1.0" encoding="utf-8"?>
 <p:sld xmlns:a="http://schemas.openxmlformats.org/drawingml/2006/main" xmlns:r="http://schemas.openxmlformats.org/officeDocument/2006/relationships" xmlns:p="http://schemas.openxmlformats.org/presentationml/2006/main">
   <p:cSld>
     <p:spTree>
@@ -3530,215 +4554,7 @@
 </p:sld>
 </file>
 
-<file path=ppt/slides/slide18.xml><?xml version="1.0" encoding="utf-8"?>
-<p:sld xmlns:a="http://schemas.openxmlformats.org/drawingml/2006/main" xmlns:r="http://schemas.openxmlformats.org/officeDocument/2006/relationships" xmlns:p="http://schemas.openxmlformats.org/presentationml/2006/main">
-  <p:cSld>
-    <p:spTree>
-      <p:nvGrpSpPr>
-        <p:cNvPr id="1" name="">
-          <a:extLst>
-            <a:ext uri="{FF2B5EF4-FFF2-40B4-BE49-F238E27FC236}">
-              <a16:creationId xmlns:a16="http://schemas.microsoft.com/office/drawing/2014/main" id="{E8EB16E0-7922-3E59-1CC4-A435416567D2}"/>
-            </a:ext>
-          </a:extLst>
-        </p:cNvPr>
-        <p:cNvGrpSpPr/>
-        <p:nvPr/>
-      </p:nvGrpSpPr>
-      <p:grpSpPr>
-        <a:xfrm>
-          <a:off x="0" y="0"/>
-          <a:ext cx="0" cy="0"/>
-          <a:chOff x="0" y="0"/>
-          <a:chExt cx="0" cy="0"/>
-        </a:xfrm>
-      </p:grpSpPr>
-      <p:sp>
-        <p:nvSpPr>
-          <p:cNvPr id="3" name="Title 2">
-            <a:extLst>
-              <a:ext uri="{FF2B5EF4-FFF2-40B4-BE49-F238E27FC236}">
-                <a16:creationId xmlns:a16="http://schemas.microsoft.com/office/drawing/2014/main" id="{3586C8FA-7D18-FC81-A126-8D216E4562CD}"/>
-              </a:ext>
-            </a:extLst>
-          </p:cNvPr>
-          <p:cNvSpPr>
-            <a:spLocks noGrp="1"/>
-          </p:cNvSpPr>
-          <p:nvPr>
-            <p:ph type="title"/>
-          </p:nvPr>
-        </p:nvSpPr>
-        <p:spPr>
-          <a:xfrm>
-            <a:off x="254645" y="137270"/>
-            <a:ext cx="6971271" cy="543697"/>
-          </a:xfrm>
-        </p:spPr>
-        <p:txBody>
-          <a:bodyPr>
-            <a:normAutofit/>
-          </a:bodyPr>
-          <a:lstStyle/>
-          <a:p>
-            <a:r>
-              <a:rPr lang="it-IT" dirty="0">
-                <a:latin typeface="Verdana" panose="020B0604030504040204" pitchFamily="34" charset="0"/>
-                <a:ea typeface="Verdana" panose="020B0604030504040204" pitchFamily="34" charset="0"/>
-              </a:rPr>
-              <a:t>User Interface - Login </a:t>
-            </a:r>
-          </a:p>
-        </p:txBody>
-      </p:sp>
-      <p:pic>
-        <p:nvPicPr>
-          <p:cNvPr id="5" name="Picture 4">
-            <a:extLst>
-              <a:ext uri="{FF2B5EF4-FFF2-40B4-BE49-F238E27FC236}">
-                <a16:creationId xmlns:a16="http://schemas.microsoft.com/office/drawing/2014/main" id="{F94CDEC5-853C-DD3C-DC4A-AD4932B2DA9F}"/>
-              </a:ext>
-            </a:extLst>
-          </p:cNvPr>
-          <p:cNvPicPr>
-            <a:picLocks noChangeAspect="1"/>
-          </p:cNvPicPr>
-          <p:nvPr/>
-        </p:nvPicPr>
-        <p:blipFill>
-          <a:blip r:embed="rId2"/>
-          <a:stretch>
-            <a:fillRect/>
-          </a:stretch>
-        </p:blipFill>
-        <p:spPr>
-          <a:xfrm>
-            <a:off x="1292606" y="1355547"/>
-            <a:ext cx="9606787" cy="4557452"/>
-          </a:xfrm>
-          <a:prstGeom prst="rect">
-            <a:avLst/>
-          </a:prstGeom>
-        </p:spPr>
-      </p:pic>
-    </p:spTree>
-    <p:extLst>
-      <p:ext uri="{BB962C8B-B14F-4D97-AF65-F5344CB8AC3E}">
-        <p14:creationId xmlns:p14="http://schemas.microsoft.com/office/powerpoint/2010/main" val="2546561001"/>
-      </p:ext>
-    </p:extLst>
-  </p:cSld>
-  <p:clrMapOvr>
-    <a:masterClrMapping/>
-  </p:clrMapOvr>
-</p:sld>
-</file>
-
-<file path=ppt/slides/slide19.xml><?xml version="1.0" encoding="utf-8"?>
-<p:sld xmlns:a="http://schemas.openxmlformats.org/drawingml/2006/main" xmlns:r="http://schemas.openxmlformats.org/officeDocument/2006/relationships" xmlns:p="http://schemas.openxmlformats.org/presentationml/2006/main">
-  <p:cSld>
-    <p:spTree>
-      <p:nvGrpSpPr>
-        <p:cNvPr id="1" name="">
-          <a:extLst>
-            <a:ext uri="{FF2B5EF4-FFF2-40B4-BE49-F238E27FC236}">
-              <a16:creationId xmlns:a16="http://schemas.microsoft.com/office/drawing/2014/main" id="{06C87CB4-4C1E-FAF8-485F-623B297BB258}"/>
-            </a:ext>
-          </a:extLst>
-        </p:cNvPr>
-        <p:cNvGrpSpPr/>
-        <p:nvPr/>
-      </p:nvGrpSpPr>
-      <p:grpSpPr>
-        <a:xfrm>
-          <a:off x="0" y="0"/>
-          <a:ext cx="0" cy="0"/>
-          <a:chOff x="0" y="0"/>
-          <a:chExt cx="0" cy="0"/>
-        </a:xfrm>
-      </p:grpSpPr>
-      <p:sp>
-        <p:nvSpPr>
-          <p:cNvPr id="3" name="Title 2">
-            <a:extLst>
-              <a:ext uri="{FF2B5EF4-FFF2-40B4-BE49-F238E27FC236}">
-                <a16:creationId xmlns:a16="http://schemas.microsoft.com/office/drawing/2014/main" id="{E5A53E1C-5291-B28D-E198-B84AADE82F08}"/>
-              </a:ext>
-            </a:extLst>
-          </p:cNvPr>
-          <p:cNvSpPr>
-            <a:spLocks noGrp="1"/>
-          </p:cNvSpPr>
-          <p:nvPr>
-            <p:ph type="title"/>
-          </p:nvPr>
-        </p:nvSpPr>
-        <p:spPr>
-          <a:xfrm>
-            <a:off x="254645" y="137270"/>
-            <a:ext cx="8740065" cy="543697"/>
-          </a:xfrm>
-        </p:spPr>
-        <p:txBody>
-          <a:bodyPr>
-            <a:normAutofit/>
-          </a:bodyPr>
-          <a:lstStyle/>
-          <a:p>
-            <a:r>
-              <a:rPr lang="it-IT" dirty="0">
-                <a:latin typeface="Verdana" panose="020B0604030504040204" pitchFamily="34" charset="0"/>
-                <a:ea typeface="Verdana" panose="020B0604030504040204" pitchFamily="34" charset="0"/>
-              </a:rPr>
-              <a:t>User Interface - Educator Home Page</a:t>
-            </a:r>
-          </a:p>
-        </p:txBody>
-      </p:sp>
-      <p:pic>
-        <p:nvPicPr>
-          <p:cNvPr id="4" name="Picture 3">
-            <a:extLst>
-              <a:ext uri="{FF2B5EF4-FFF2-40B4-BE49-F238E27FC236}">
-                <a16:creationId xmlns:a16="http://schemas.microsoft.com/office/drawing/2014/main" id="{1426E134-7688-76F5-51D0-83DBD4E33321}"/>
-              </a:ext>
-            </a:extLst>
-          </p:cNvPr>
-          <p:cNvPicPr>
-            <a:picLocks noChangeAspect="1"/>
-          </p:cNvPicPr>
-          <p:nvPr/>
-        </p:nvPicPr>
-        <p:blipFill>
-          <a:blip r:embed="rId2"/>
-          <a:stretch>
-            <a:fillRect/>
-          </a:stretch>
-        </p:blipFill>
-        <p:spPr>
-          <a:xfrm>
-            <a:off x="1219200" y="1300199"/>
-            <a:ext cx="9753600" cy="4560258"/>
-          </a:xfrm>
-          <a:prstGeom prst="rect">
-            <a:avLst/>
-          </a:prstGeom>
-        </p:spPr>
-      </p:pic>
-    </p:spTree>
-    <p:extLst>
-      <p:ext uri="{BB962C8B-B14F-4D97-AF65-F5344CB8AC3E}">
-        <p14:creationId xmlns:p14="http://schemas.microsoft.com/office/powerpoint/2010/main" val="1412243571"/>
-      </p:ext>
-    </p:extLst>
-  </p:cSld>
-  <p:clrMapOvr>
-    <a:masterClrMapping/>
-  </p:clrMapOvr>
-</p:sld>
-</file>
-
-<file path=ppt/slides/slide2.xml><?xml version="1.0" encoding="utf-8"?>
+<file path=ppt/slides/slide3.xml><?xml version="1.0" encoding="utf-8"?>
 <p:sld xmlns:a="http://schemas.openxmlformats.org/drawingml/2006/main" xmlns:r="http://schemas.openxmlformats.org/officeDocument/2006/relationships" xmlns:p="http://schemas.openxmlformats.org/presentationml/2006/main">
   <p:cSld>
     <p:spTree>
@@ -3800,7 +4616,7 @@
         <p:spPr>
           <a:xfrm>
             <a:off x="746449" y="1443841"/>
-            <a:ext cx="9442580" cy="3416320"/>
+            <a:ext cx="7660433" cy="3970318"/>
           </a:xfrm>
           <a:prstGeom prst="rect">
             <a:avLst/>
@@ -3927,125 +4743,7 @@
 </p:sld>
 </file>
 
-<file path=ppt/slides/slide20.xml><?xml version="1.0" encoding="utf-8"?>
-<p:sld xmlns:a="http://schemas.openxmlformats.org/drawingml/2006/main" xmlns:r="http://schemas.openxmlformats.org/officeDocument/2006/relationships" xmlns:p="http://schemas.openxmlformats.org/presentationml/2006/main">
-  <p:cSld>
-    <p:spTree>
-      <p:nvGrpSpPr>
-        <p:cNvPr id="1" name="">
-          <a:extLst>
-            <a:ext uri="{FF2B5EF4-FFF2-40B4-BE49-F238E27FC236}">
-              <a16:creationId xmlns:a16="http://schemas.microsoft.com/office/drawing/2014/main" id="{87599273-22A7-370A-791A-7B2699D0AF72}"/>
-            </a:ext>
-          </a:extLst>
-        </p:cNvPr>
-        <p:cNvGrpSpPr/>
-        <p:nvPr/>
-      </p:nvGrpSpPr>
-      <p:grpSpPr>
-        <a:xfrm>
-          <a:off x="0" y="0"/>
-          <a:ext cx="0" cy="0"/>
-          <a:chOff x="0" y="0"/>
-          <a:chExt cx="0" cy="0"/>
-        </a:xfrm>
-      </p:grpSpPr>
-      <p:sp>
-        <p:nvSpPr>
-          <p:cNvPr id="3" name="Title 2">
-            <a:extLst>
-              <a:ext uri="{FF2B5EF4-FFF2-40B4-BE49-F238E27FC236}">
-                <a16:creationId xmlns:a16="http://schemas.microsoft.com/office/drawing/2014/main" id="{3C17DB2F-25FF-2B04-1A76-BDE37EE82AA1}"/>
-              </a:ext>
-            </a:extLst>
-          </p:cNvPr>
-          <p:cNvSpPr>
-            <a:spLocks noGrp="1"/>
-          </p:cNvSpPr>
-          <p:nvPr>
-            <p:ph type="title"/>
-          </p:nvPr>
-        </p:nvSpPr>
-        <p:spPr>
-          <a:xfrm>
-            <a:off x="254645" y="137270"/>
-            <a:ext cx="8740065" cy="543697"/>
-          </a:xfrm>
-        </p:spPr>
-        <p:txBody>
-          <a:bodyPr>
-            <a:normAutofit/>
-          </a:bodyPr>
-          <a:lstStyle/>
-          <a:p>
-            <a:r>
-              <a:rPr lang="it-IT" dirty="0">
-                <a:latin typeface="Verdana" panose="020B0604030504040204" pitchFamily="34" charset="0"/>
-                <a:ea typeface="Verdana" panose="020B0604030504040204" pitchFamily="34" charset="0"/>
-              </a:rPr>
-              <a:t>User Interface - </a:t>
-            </a:r>
-            <a:r>
-              <a:rPr lang="it-IT" dirty="0" err="1">
-                <a:latin typeface="Verdana" panose="020B0604030504040204" pitchFamily="34" charset="0"/>
-                <a:ea typeface="Verdana" panose="020B0604030504040204" pitchFamily="34" charset="0"/>
-              </a:rPr>
-              <a:t>Student</a:t>
-            </a:r>
-            <a:r>
-              <a:rPr lang="it-IT" dirty="0">
-                <a:latin typeface="Verdana" panose="020B0604030504040204" pitchFamily="34" charset="0"/>
-                <a:ea typeface="Verdana" panose="020B0604030504040204" pitchFamily="34" charset="0"/>
-              </a:rPr>
-              <a:t> Home Page</a:t>
-            </a:r>
-          </a:p>
-        </p:txBody>
-      </p:sp>
-      <p:pic>
-        <p:nvPicPr>
-          <p:cNvPr id="5" name="Picture 4">
-            <a:extLst>
-              <a:ext uri="{FF2B5EF4-FFF2-40B4-BE49-F238E27FC236}">
-                <a16:creationId xmlns:a16="http://schemas.microsoft.com/office/drawing/2014/main" id="{B8A2E0CE-54AE-3AE5-3110-45040D5497B5}"/>
-              </a:ext>
-            </a:extLst>
-          </p:cNvPr>
-          <p:cNvPicPr>
-            <a:picLocks noChangeAspect="1"/>
-          </p:cNvPicPr>
-          <p:nvPr/>
-        </p:nvPicPr>
-        <p:blipFill>
-          <a:blip r:embed="rId2"/>
-          <a:stretch>
-            <a:fillRect/>
-          </a:stretch>
-        </p:blipFill>
-        <p:spPr>
-          <a:xfrm>
-            <a:off x="1183435" y="1320800"/>
-            <a:ext cx="9825130" cy="4612640"/>
-          </a:xfrm>
-          <a:prstGeom prst="rect">
-            <a:avLst/>
-          </a:prstGeom>
-        </p:spPr>
-      </p:pic>
-    </p:spTree>
-    <p:extLst>
-      <p:ext uri="{BB962C8B-B14F-4D97-AF65-F5344CB8AC3E}">
-        <p14:creationId xmlns:p14="http://schemas.microsoft.com/office/powerpoint/2010/main" val="2887538206"/>
-      </p:ext>
-    </p:extLst>
-  </p:cSld>
-  <p:clrMapOvr>
-    <a:masterClrMapping/>
-  </p:clrMapOvr>
-</p:sld>
-</file>
-
-<file path=ppt/slides/slide3.xml><?xml version="1.0" encoding="utf-8"?>
+<file path=ppt/slides/slide4.xml><?xml version="1.0" encoding="utf-8"?>
 <p:sld xmlns:a="http://schemas.openxmlformats.org/drawingml/2006/main" xmlns:r="http://schemas.openxmlformats.org/officeDocument/2006/relationships" xmlns:p="http://schemas.openxmlformats.org/presentationml/2006/main">
   <p:cSld>
     <p:spTree>
@@ -4188,7 +4886,7 @@
           <a:p>
             <a:r>
               <a:rPr lang="en-GB" sz="1600" b="1" dirty="0"/>
-              <a:t>Consolidation stage: </a:t>
+              <a:t>Consolidation Stage: </a:t>
             </a:r>
             <a:r>
               <a:rPr lang="en-GB" sz="1600" dirty="0"/>
@@ -4244,7 +4942,7 @@
 </p:sld>
 </file>
 
-<file path=ppt/slides/slide4.xml><?xml version="1.0" encoding="utf-8"?>
+<file path=ppt/slides/slide5.xml><?xml version="1.0" encoding="utf-8"?>
 <p:sld xmlns:a="http://schemas.openxmlformats.org/drawingml/2006/main" xmlns:r="http://schemas.openxmlformats.org/officeDocument/2006/relationships" xmlns:p="http://schemas.openxmlformats.org/presentationml/2006/main">
   <p:cSld>
     <p:spTree>
@@ -4466,7 +5164,7 @@
 </p:sld>
 </file>
 
-<file path=ppt/slides/slide5.xml><?xml version="1.0" encoding="utf-8"?>
+<file path=ppt/slides/slide6.xml><?xml version="1.0" encoding="utf-8"?>
 <p:sld xmlns:a="http://schemas.openxmlformats.org/drawingml/2006/main" xmlns:r="http://schemas.openxmlformats.org/officeDocument/2006/relationships" xmlns:p="http://schemas.openxmlformats.org/presentationml/2006/main">
   <p:cSld>
     <p:spTree>
@@ -4518,11 +5216,18 @@
           <a:lstStyle/>
           <a:p>
             <a:r>
+              <a:rPr lang="it-IT" dirty="0" err="1">
+                <a:latin typeface="Verdana" panose="020B0604030504040204" pitchFamily="34" charset="0"/>
+                <a:ea typeface="Verdana" panose="020B0604030504040204" pitchFamily="34" charset="0"/>
+              </a:rPr>
+              <a:t>Assumptions</a:t>
+            </a:r>
+            <a:r>
               <a:rPr lang="it-IT" dirty="0">
                 <a:latin typeface="Verdana" panose="020B0604030504040204" pitchFamily="34" charset="0"/>
                 <a:ea typeface="Verdana" panose="020B0604030504040204" pitchFamily="34" charset="0"/>
               </a:rPr>
-              <a:t>Assumptions</a:t>
+              <a:t> - 1</a:t>
             </a:r>
           </a:p>
         </p:txBody>
@@ -4542,7 +5247,7 @@
         <p:spPr>
           <a:xfrm>
             <a:off x="718457" y="1462502"/>
-            <a:ext cx="9843796" cy="4031873"/>
+            <a:ext cx="9843796" cy="3693319"/>
           </a:xfrm>
           <a:prstGeom prst="rect">
             <a:avLst/>
@@ -4556,78 +5261,85 @@
           <a:lstStyle/>
           <a:p>
             <a:r>
-              <a:rPr lang="en-GB" sz="1600" b="1" dirty="0"/>
-              <a:t>H1</a:t>
-            </a:r>
-            <a:r>
-              <a:rPr lang="en-GB" sz="1600" dirty="0"/>
-              <a:t> - The students who participate in a Battle properly set up the GitHub Action for code submissions.</a:t>
-            </a:r>
-          </a:p>
-          <a:p>
-            <a:endParaRPr lang="en-GB" sz="1600" dirty="0"/>
-          </a:p>
-          <a:p>
-            <a:r>
-              <a:rPr lang="en-GB" sz="1600" b="1" dirty="0"/>
-              <a:t>H2</a:t>
-            </a:r>
-            <a:r>
-              <a:rPr lang="en-GB" sz="1600" dirty="0"/>
-              <a:t> - Educators will provide permission to manage the Tournaments they are creating during the creation process.</a:t>
-            </a:r>
-          </a:p>
-          <a:p>
-            <a:endParaRPr lang="en-GB" sz="1600" dirty="0"/>
-          </a:p>
-          <a:p>
-            <a:r>
-              <a:rPr lang="en-GB" sz="1600" b="1" dirty="0"/>
-              <a:t>H3</a:t>
-            </a:r>
-            <a:r>
-              <a:rPr lang="en-GB" sz="1600" dirty="0"/>
-              <a:t> - Students will form their teams as they try to enroll in a Battle. They will invite other Students, up to the maximum number allowed in a team for the Battle minus one. If not enough Students among the invited ones accept the invite as the subscription deadline expires, the Students in the team will not actually be enrolled in the Battle.</a:t>
-            </a:r>
-          </a:p>
-          <a:p>
-            <a:endParaRPr lang="en-GB" sz="1600" dirty="0"/>
-          </a:p>
-          <a:p>
-            <a:r>
-              <a:rPr lang="en-GB" sz="1600" b="1" dirty="0"/>
-              <a:t>H4</a:t>
-            </a:r>
-            <a:r>
-              <a:rPr lang="en-GB" sz="1600" dirty="0"/>
-              <a:t> - Battles can only be created when the Tournament subscription deadline has expired, that is, the Tournament is ongoing. Tournaments do not have a fixed duration. They must be closed by an Educator while all the Battles which were created have ended, that is, no Battle is neither ongoing or in Consolidation Stage.</a:t>
-            </a:r>
-          </a:p>
-          <a:p>
-            <a:endParaRPr lang="en-GB" sz="1600" dirty="0"/>
-          </a:p>
-          <a:p>
-            <a:r>
-              <a:rPr lang="en-GB" sz="1600" b="1" dirty="0"/>
-              <a:t>H5</a:t>
-            </a:r>
-            <a:r>
-              <a:rPr lang="en-GB" sz="1600" dirty="0"/>
-              <a:t> - Every Battle enters the Consolidation Stage as the submission deadline expires. Battles end when an Educator closes them. Before closing a Battle, Educators can make manual corrections.</a:t>
-            </a:r>
-          </a:p>
-          <a:p>
-            <a:endParaRPr lang="en-GB" sz="1600" dirty="0"/>
-          </a:p>
-          <a:p>
-            <a:r>
-              <a:rPr lang="en-GB" sz="1600" b="1" dirty="0"/>
-              <a:t>H6</a:t>
-            </a:r>
-            <a:r>
-              <a:rPr lang="en-GB" sz="1600" dirty="0"/>
-              <a:t> - Notifications are only meant to be sent to the Students.</a:t>
-            </a:r>
+              <a:rPr lang="en-GB" b="0" i="0" dirty="0">
+                <a:effectLst/>
+                <a:latin typeface="Söhne"/>
+              </a:rPr>
+              <a:t>Here are the assumptions we made trying to take the most reasonable choice in several aspects:</a:t>
+            </a:r>
+          </a:p>
+          <a:p>
+            <a:endParaRPr lang="en-GB" dirty="0">
+              <a:latin typeface="Söhne"/>
+            </a:endParaRPr>
+          </a:p>
+          <a:p>
+            <a:r>
+              <a:rPr lang="en-GB" b="1" dirty="0"/>
+              <a:t>A1.</a:t>
+            </a:r>
+            <a:r>
+              <a:rPr lang="en-GB" dirty="0"/>
+              <a:t>  Proper set up of GitHub Actions (Domain Assumption)</a:t>
+            </a:r>
+          </a:p>
+          <a:p>
+            <a:endParaRPr lang="en-GB" dirty="0"/>
+          </a:p>
+          <a:p>
+            <a:r>
+              <a:rPr lang="en-GB" b="1" dirty="0"/>
+              <a:t>A2.</a:t>
+            </a:r>
+            <a:r>
+              <a:rPr lang="en-GB" dirty="0"/>
+              <a:t>  Tournaments' management rights are guaranteed during the creating process.</a:t>
+            </a:r>
+          </a:p>
+          <a:p>
+            <a:endParaRPr lang="en-GB" dirty="0"/>
+          </a:p>
+          <a:p>
+            <a:r>
+              <a:rPr lang="en-GB" b="1" dirty="0"/>
+              <a:t>A3.</a:t>
+            </a:r>
+            <a:r>
+              <a:rPr lang="en-GB" dirty="0"/>
+              <a:t>  Educators can "fully manage" a Tournament or they cannot at all.</a:t>
+            </a:r>
+          </a:p>
+          <a:p>
+            <a:endParaRPr lang="en-GB" dirty="0"/>
+          </a:p>
+          <a:p>
+            <a:r>
+              <a:rPr lang="en-GB" b="1" dirty="0"/>
+              <a:t>A4.  </a:t>
+            </a:r>
+            <a:r>
+              <a:rPr lang="en-GB" dirty="0"/>
+              <a:t>Students can only invite members for their time when joining a Battle. </a:t>
+            </a:r>
+          </a:p>
+          <a:p>
+            <a:endParaRPr lang="en-GB" dirty="0"/>
+          </a:p>
+          <a:p>
+            <a:r>
+              <a:rPr lang="en-GB" b="1" dirty="0"/>
+              <a:t>A5.</a:t>
+            </a:r>
+            <a:r>
+              <a:rPr lang="en-GB" dirty="0"/>
+              <a:t>  Students who entered a team accepting an invite cannot invite other members.</a:t>
+            </a:r>
+          </a:p>
+          <a:p>
+            <a:endParaRPr lang="en-GB" dirty="0"/>
+          </a:p>
+          <a:p>
+            <a:endParaRPr lang="en-GB" dirty="0"/>
           </a:p>
         </p:txBody>
       </p:sp>
@@ -4644,7 +5356,7 @@
 </p:sld>
 </file>
 
-<file path=ppt/slides/slide6.xml><?xml version="1.0" encoding="utf-8"?>
+<file path=ppt/slides/slide7.xml><?xml version="1.0" encoding="utf-8"?>
 <p:sld xmlns:a="http://schemas.openxmlformats.org/drawingml/2006/main" xmlns:r="http://schemas.openxmlformats.org/officeDocument/2006/relationships" xmlns:p="http://schemas.openxmlformats.org/presentationml/2006/main">
   <p:cSld>
     <p:spTree>
@@ -4652,7 +5364,7 @@
         <p:cNvPr id="1" name="">
           <a:extLst>
             <a:ext uri="{FF2B5EF4-FFF2-40B4-BE49-F238E27FC236}">
-              <a16:creationId xmlns:a16="http://schemas.microsoft.com/office/drawing/2014/main" id="{63D655CA-AAD5-48E6-A7ED-410FD849AF9A}"/>
+              <a16:creationId xmlns:a16="http://schemas.microsoft.com/office/drawing/2014/main" id="{BC58D82E-C470-90F5-8EFD-8CEADDA61F16}"/>
             </a:ext>
           </a:extLst>
         </p:cNvPr>
@@ -4672,7 +5384,7 @@
           <p:cNvPr id="3" name="Title 2">
             <a:extLst>
               <a:ext uri="{FF2B5EF4-FFF2-40B4-BE49-F238E27FC236}">
-                <a16:creationId xmlns:a16="http://schemas.microsoft.com/office/drawing/2014/main" id="{885EED14-FD22-B7EE-EA43-0FF59CF42CE6}"/>
+                <a16:creationId xmlns:a16="http://schemas.microsoft.com/office/drawing/2014/main" id="{E87C24B5-F3B4-ECAA-7492-A8EED1C95AFE}"/>
               </a:ext>
             </a:extLst>
           </p:cNvPr>
@@ -4696,54 +5408,151 @@
           <a:lstStyle/>
           <a:p>
             <a:r>
+              <a:rPr lang="it-IT" dirty="0" err="1">
+                <a:latin typeface="Verdana" panose="020B0604030504040204" pitchFamily="34" charset="0"/>
+                <a:ea typeface="Verdana" panose="020B0604030504040204" pitchFamily="34" charset="0"/>
+              </a:rPr>
+              <a:t>Assumptions</a:t>
+            </a:r>
+            <a:r>
               <a:rPr lang="it-IT" dirty="0">
                 <a:latin typeface="Verdana" panose="020B0604030504040204" pitchFamily="34" charset="0"/>
                 <a:ea typeface="Verdana" panose="020B0604030504040204" pitchFamily="34" charset="0"/>
               </a:rPr>
-              <a:t>DD - Component View</a:t>
+              <a:t> - 2</a:t>
             </a:r>
           </a:p>
         </p:txBody>
       </p:sp>
-      <p:pic>
-        <p:nvPicPr>
-          <p:cNvPr id="5" name="Picture 4" descr="A diagram of a computer&#10;&#10;Description automatically generated">
+      <p:sp>
+        <p:nvSpPr>
+          <p:cNvPr id="2" name="TextBox 1">
             <a:extLst>
               <a:ext uri="{FF2B5EF4-FFF2-40B4-BE49-F238E27FC236}">
-                <a16:creationId xmlns:a16="http://schemas.microsoft.com/office/drawing/2014/main" id="{0B545099-0713-9382-EE42-A3293A92E584}"/>
+                <a16:creationId xmlns:a16="http://schemas.microsoft.com/office/drawing/2014/main" id="{15A33C5D-F9D9-B39A-EEB9-DCC6BD3F9DEC}"/>
               </a:ext>
             </a:extLst>
           </p:cNvPr>
-          <p:cNvPicPr>
-            <a:picLocks noChangeAspect="1"/>
-          </p:cNvPicPr>
+          <p:cNvSpPr txBox="1"/>
           <p:nvPr/>
-        </p:nvPicPr>
-        <p:blipFill rotWithShape="1">
-          <a:blip r:embed="rId2">
-            <a:extLst>
-              <a:ext uri="{28A0092B-C50C-407E-A947-70E740481C1C}">
-                <a14:useLocalDpi xmlns:a14="http://schemas.microsoft.com/office/drawing/2010/main" val="0"/>
-              </a:ext>
-            </a:extLst>
-          </a:blip>
-          <a:srcRect t="3929" b="4126"/>
-          <a:stretch/>
-        </p:blipFill>
-        <p:spPr>
-          <a:xfrm>
-            <a:off x="1969800" y="1155627"/>
-            <a:ext cx="8252400" cy="4974764"/>
+        </p:nvSpPr>
+        <p:spPr>
+          <a:xfrm>
+            <a:off x="718457" y="1462502"/>
+            <a:ext cx="9843796" cy="3693319"/>
           </a:xfrm>
           <a:prstGeom prst="rect">
             <a:avLst/>
           </a:prstGeom>
-        </p:spPr>
-      </p:pic>
+          <a:noFill/>
+        </p:spPr>
+        <p:txBody>
+          <a:bodyPr wrap="square">
+            <a:spAutoFit/>
+          </a:bodyPr>
+          <a:lstStyle/>
+          <a:p>
+            <a:r>
+              <a:rPr lang="en-GB" b="0" i="0" dirty="0">
+                <a:effectLst/>
+                <a:latin typeface="Söhne"/>
+              </a:rPr>
+              <a:t>Here are the assumptions we made trying to take the most reasonable choice in several aspects:</a:t>
+            </a:r>
+            <a:endParaRPr lang="en-GB" b="1" dirty="0"/>
+          </a:p>
+          <a:p>
+            <a:endParaRPr lang="en-GB" b="1" dirty="0"/>
+          </a:p>
+          <a:p>
+            <a:r>
+              <a:rPr lang="en-GB" b="1" dirty="0"/>
+              <a:t>A6. </a:t>
+            </a:r>
+            <a:r>
+              <a:rPr lang="en-GB" dirty="0"/>
+              <a:t> Battles can be in SUBSCRIPTION, ONGOING, CONSOLIDATION or ENDED Stage.</a:t>
+            </a:r>
+          </a:p>
+          <a:p>
+            <a:endParaRPr lang="en-GB" dirty="0"/>
+          </a:p>
+          <a:p>
+            <a:r>
+              <a:rPr lang="en-GB" b="1" dirty="0"/>
+              <a:t>A7.</a:t>
+            </a:r>
+            <a:r>
+              <a:rPr lang="en-GB" dirty="0"/>
+              <a:t>  Tournaments can be in SUBSCRIPTION, ONGOING or ENDED Stage.</a:t>
+            </a:r>
+          </a:p>
+          <a:p>
+            <a:endParaRPr lang="en-GB" dirty="0"/>
+          </a:p>
+          <a:p>
+            <a:r>
+              <a:rPr lang="en-GB" b="1" dirty="0"/>
+              <a:t>A8.</a:t>
+            </a:r>
+            <a:r>
+              <a:rPr lang="en-GB" dirty="0"/>
+              <a:t>  Battles can only be created when the Tournament is </a:t>
+            </a:r>
+            <a:r>
+              <a:rPr lang="en-GB" i="1" dirty="0"/>
+              <a:t>ONGOING</a:t>
+            </a:r>
+            <a:r>
+              <a:rPr lang="en-GB" dirty="0"/>
+              <a:t>.</a:t>
+            </a:r>
+          </a:p>
+          <a:p>
+            <a:endParaRPr lang="en-GB" dirty="0"/>
+          </a:p>
+          <a:p>
+            <a:r>
+              <a:rPr lang="en-GB" b="1" dirty="0"/>
+              <a:t>A9. </a:t>
+            </a:r>
+            <a:r>
+              <a:rPr lang="en-GB" dirty="0"/>
+              <a:t> Tournaments do not have a fixed deadline.</a:t>
+            </a:r>
+          </a:p>
+          <a:p>
+            <a:endParaRPr lang="en-GB" dirty="0"/>
+          </a:p>
+          <a:p>
+            <a:r>
+              <a:rPr lang="en-GB" b="1" dirty="0"/>
+              <a:t>A10. </a:t>
+            </a:r>
+            <a:r>
+              <a:rPr lang="en-GB" dirty="0"/>
+              <a:t> Every Battle enters the Consolidation Stage.</a:t>
+            </a:r>
+          </a:p>
+          <a:p>
+            <a:endParaRPr lang="en-GB" dirty="0"/>
+          </a:p>
+          <a:p>
+            <a:r>
+              <a:rPr lang="en-GB" b="1" dirty="0"/>
+              <a:t>A11.</a:t>
+            </a:r>
+            <a:r>
+              <a:rPr lang="en-GB" dirty="0"/>
+              <a:t> Notifications are only meant to be sent to the Students.</a:t>
+            </a:r>
+          </a:p>
+        </p:txBody>
+      </p:sp>
     </p:spTree>
     <p:extLst>
       <p:ext uri="{BB962C8B-B14F-4D97-AF65-F5344CB8AC3E}">
-        <p14:creationId xmlns:p14="http://schemas.microsoft.com/office/powerpoint/2010/main" val="742634822"/>
+        <p14:creationId xmlns:p14="http://schemas.microsoft.com/office/powerpoint/2010/main" val="2998518305"/>
       </p:ext>
     </p:extLst>
   </p:cSld>
@@ -4753,7 +5562,7 @@
 </p:sld>
 </file>
 
-<file path=ppt/slides/slide7.xml><?xml version="1.0" encoding="utf-8"?>
+<file path=ppt/slides/slide8.xml><?xml version="1.0" encoding="utf-8"?>
 <p:sld xmlns:a="http://schemas.openxmlformats.org/drawingml/2006/main" xmlns:r="http://schemas.openxmlformats.org/officeDocument/2006/relationships" xmlns:p="http://schemas.openxmlformats.org/presentationml/2006/main">
   <p:cSld>
     <p:spTree>
@@ -4761,7 +5570,111 @@
         <p:cNvPr id="1" name="">
           <a:extLst>
             <a:ext uri="{FF2B5EF4-FFF2-40B4-BE49-F238E27FC236}">
-              <a16:creationId xmlns:a16="http://schemas.microsoft.com/office/drawing/2014/main" id="{5169B7E9-FC87-EA62-B838-B5659C2DD0A2}"/>
+              <a16:creationId xmlns:a16="http://schemas.microsoft.com/office/drawing/2014/main" id="{FBBDAB5A-844E-AA9D-BD76-21E63DE124BA}"/>
+            </a:ext>
+          </a:extLst>
+        </p:cNvPr>
+        <p:cNvGrpSpPr/>
+        <p:nvPr/>
+      </p:nvGrpSpPr>
+      <p:grpSpPr>
+        <a:xfrm>
+          <a:off x="0" y="0"/>
+          <a:ext cx="0" cy="0"/>
+          <a:chOff x="0" y="0"/>
+          <a:chExt cx="0" cy="0"/>
+        </a:xfrm>
+      </p:grpSpPr>
+      <p:sp>
+        <p:nvSpPr>
+          <p:cNvPr id="9" name="Title 8">
+            <a:extLst>
+              <a:ext uri="{FF2B5EF4-FFF2-40B4-BE49-F238E27FC236}">
+                <a16:creationId xmlns:a16="http://schemas.microsoft.com/office/drawing/2014/main" id="{73CDCF5B-840B-62D1-CD75-2A74EE21085E}"/>
+              </a:ext>
+            </a:extLst>
+          </p:cNvPr>
+          <p:cNvSpPr>
+            <a:spLocks noGrp="1"/>
+          </p:cNvSpPr>
+          <p:nvPr>
+            <p:ph type="title"/>
+          </p:nvPr>
+        </p:nvSpPr>
+        <p:spPr>
+          <a:xfrm>
+            <a:off x="838200" y="3429000"/>
+            <a:ext cx="10515600" cy="1325563"/>
+          </a:xfrm>
+        </p:spPr>
+        <p:txBody>
+          <a:bodyPr/>
+          <a:lstStyle/>
+          <a:p>
+            <a:r>
+              <a:rPr lang="it-IT" sz="6600" dirty="0">
+                <a:latin typeface="+mn-lt"/>
+              </a:rPr>
+              <a:t>DD</a:t>
+            </a:r>
+            <a:endParaRPr lang="it-IT" dirty="0">
+              <a:latin typeface="+mn-lt"/>
+            </a:endParaRPr>
+          </a:p>
+        </p:txBody>
+      </p:sp>
+      <p:pic>
+        <p:nvPicPr>
+          <p:cNvPr id="7" name="Picture 6">
+            <a:extLst>
+              <a:ext uri="{FF2B5EF4-FFF2-40B4-BE49-F238E27FC236}">
+                <a16:creationId xmlns:a16="http://schemas.microsoft.com/office/drawing/2014/main" id="{DBB4BE45-4486-E3DF-7170-D96EAEC3AD46}"/>
+              </a:ext>
+            </a:extLst>
+          </p:cNvPr>
+          <p:cNvPicPr>
+            <a:picLocks noChangeAspect="1"/>
+          </p:cNvPicPr>
+          <p:nvPr/>
+        </p:nvPicPr>
+        <p:blipFill>
+          <a:blip r:embed="rId2"/>
+          <a:stretch>
+            <a:fillRect/>
+          </a:stretch>
+        </p:blipFill>
+        <p:spPr>
+          <a:xfrm>
+            <a:off x="4367719" y="5913038"/>
+            <a:ext cx="3754877" cy="944962"/>
+          </a:xfrm>
+          <a:prstGeom prst="rect">
+            <a:avLst/>
+          </a:prstGeom>
+        </p:spPr>
+      </p:pic>
+    </p:spTree>
+    <p:extLst>
+      <p:ext uri="{BB962C8B-B14F-4D97-AF65-F5344CB8AC3E}">
+        <p14:creationId xmlns:p14="http://schemas.microsoft.com/office/powerpoint/2010/main" val="3674036936"/>
+      </p:ext>
+    </p:extLst>
+  </p:cSld>
+  <p:clrMapOvr>
+    <a:masterClrMapping/>
+  </p:clrMapOvr>
+</p:sld>
+</file>
+
+<file path=ppt/slides/slide9.xml><?xml version="1.0" encoding="utf-8"?>
+<p:sld xmlns:a="http://schemas.openxmlformats.org/drawingml/2006/main" xmlns:r="http://schemas.openxmlformats.org/officeDocument/2006/relationships" xmlns:p="http://schemas.openxmlformats.org/presentationml/2006/main">
+  <p:cSld>
+    <p:spTree>
+      <p:nvGrpSpPr>
+        <p:cNvPr id="1" name="">
+          <a:extLst>
+            <a:ext uri="{FF2B5EF4-FFF2-40B4-BE49-F238E27FC236}">
+              <a16:creationId xmlns:a16="http://schemas.microsoft.com/office/drawing/2014/main" id="{952EA7AB-C33D-27D6-2166-2116A686F035}"/>
             </a:ext>
           </a:extLst>
         </p:cNvPr>
@@ -4781,7 +5694,7 @@
           <p:cNvPr id="3" name="Title 2">
             <a:extLst>
               <a:ext uri="{FF2B5EF4-FFF2-40B4-BE49-F238E27FC236}">
-                <a16:creationId xmlns:a16="http://schemas.microsoft.com/office/drawing/2014/main" id="{8A3BA3C1-B692-ED60-6BFF-BE9D2259FF8B}"/>
+                <a16:creationId xmlns:a16="http://schemas.microsoft.com/office/drawing/2014/main" id="{D477F25C-B6F7-C5D9-23C4-0CF07B92A349}"/>
               </a:ext>
             </a:extLst>
           </p:cNvPr>
@@ -4809,617 +5722,50 @@
                 <a:latin typeface="Verdana" panose="020B0604030504040204" pitchFamily="34" charset="0"/>
                 <a:ea typeface="Verdana" panose="020B0604030504040204" pitchFamily="34" charset="0"/>
               </a:rPr>
-              <a:t>DD - Architecture</a:t>
+              <a:t>DD - ER Diagram</a:t>
             </a:r>
           </a:p>
         </p:txBody>
       </p:sp>
-      <p:sp>
-        <p:nvSpPr>
-          <p:cNvPr id="4" name="TextBox 3">
+      <p:pic>
+        <p:nvPicPr>
+          <p:cNvPr id="7" name="Picture 6" descr="A screenshot of a computer screen&#10;&#10;Description automatically generated">
             <a:extLst>
               <a:ext uri="{FF2B5EF4-FFF2-40B4-BE49-F238E27FC236}">
-                <a16:creationId xmlns:a16="http://schemas.microsoft.com/office/drawing/2014/main" id="{5F85165E-4E44-4A85-653B-FBD4D39D7A47}"/>
+                <a16:creationId xmlns:a16="http://schemas.microsoft.com/office/drawing/2014/main" id="{4BD8E39B-0A31-62AB-9210-9D40B3639617}"/>
               </a:ext>
             </a:extLst>
           </p:cNvPr>
-          <p:cNvSpPr txBox="1"/>
+          <p:cNvPicPr>
+            <a:picLocks noChangeAspect="1"/>
+          </p:cNvPicPr>
           <p:nvPr/>
-        </p:nvSpPr>
-        <p:spPr>
-          <a:xfrm>
-            <a:off x="689298" y="1449109"/>
-            <a:ext cx="10068897" cy="3370153"/>
+        </p:nvPicPr>
+        <p:blipFill rotWithShape="1">
+          <a:blip r:embed="rId2" cstate="print">
+            <a:extLst>
+              <a:ext uri="{28A0092B-C50C-407E-A947-70E740481C1C}">
+                <a14:useLocalDpi xmlns:a14="http://schemas.microsoft.com/office/drawing/2010/main" val="0"/>
+              </a:ext>
+            </a:extLst>
+          </a:blip>
+          <a:srcRect t="5769"/>
+          <a:stretch/>
+        </p:blipFill>
+        <p:spPr>
+          <a:xfrm>
+            <a:off x="3247308" y="1173252"/>
+            <a:ext cx="5697383" cy="4856848"/>
           </a:xfrm>
           <a:prstGeom prst="rect">
             <a:avLst/>
           </a:prstGeom>
-          <a:noFill/>
-        </p:spPr>
-        <p:txBody>
-          <a:bodyPr wrap="square">
-            <a:spAutoFit/>
-          </a:bodyPr>
-          <a:lstStyle/>
-          <a:p>
-            <a:pPr>
-              <a:spcAft>
-                <a:spcPts val="600"/>
-              </a:spcAft>
-            </a:pPr>
-            <a:r>
-              <a:rPr lang="en-GB" b="1" dirty="0"/>
-              <a:t>Three-Tier Architecture</a:t>
-            </a:r>
-          </a:p>
-          <a:p>
-            <a:r>
-              <a:rPr lang="en-GB" dirty="0"/>
-              <a:t>a.</a:t>
-            </a:r>
-            <a:r>
-              <a:rPr lang="en-GB" b="0" i="0" dirty="0">
-                <a:effectLst/>
-              </a:rPr>
-              <a:t> Modern interpretation of the 3-tier architecture, utilizing contemporary technologies.</a:t>
-            </a:r>
-          </a:p>
-          <a:p>
-            <a:r>
-              <a:rPr lang="en-GB" dirty="0"/>
-              <a:t>b. </a:t>
-            </a:r>
-            <a:r>
-              <a:rPr lang="en-GB" b="0" i="0" dirty="0">
-                <a:effectLst/>
-              </a:rPr>
-              <a:t>Nginx serves static content (React app) to the browser.</a:t>
-            </a:r>
-          </a:p>
-          <a:p>
-            <a:r>
-              <a:rPr lang="en-GB" dirty="0"/>
-              <a:t>c. The rest </a:t>
-            </a:r>
-            <a:r>
-              <a:rPr lang="en-GB" b="0" i="0" dirty="0">
-                <a:effectLst/>
-              </a:rPr>
-              <a:t>of the Presentation layer and the Application layer implemented by our Spring application.</a:t>
-            </a:r>
-          </a:p>
-          <a:p>
-            <a:r>
-              <a:rPr lang="en-GB" dirty="0"/>
-              <a:t>d.</a:t>
-            </a:r>
-            <a:r>
-              <a:rPr lang="en-GB" b="0" i="0" dirty="0">
-                <a:effectLst/>
-              </a:rPr>
-              <a:t> The Data layer is managed by a relational database hosted on DigitalOcean's cloud infrastructure.</a:t>
-            </a:r>
-          </a:p>
-          <a:p>
-            <a:endParaRPr lang="en-GB" sz="1800" dirty="0"/>
-          </a:p>
-          <a:p>
-            <a:pPr>
-              <a:spcAft>
-                <a:spcPts val="600"/>
-              </a:spcAft>
-            </a:pPr>
-            <a:r>
-              <a:rPr lang="en-GB" b="1" dirty="0"/>
-              <a:t>RESTful APIs</a:t>
-            </a:r>
-          </a:p>
-          <a:p>
-            <a:r>
-              <a:rPr lang="en-GB" dirty="0"/>
-              <a:t>a. The client retrieves the resources by sending HTTP requests to our server.</a:t>
-            </a:r>
-          </a:p>
-          <a:p>
-            <a:endParaRPr lang="en-GB" sz="1800" b="1" dirty="0"/>
-          </a:p>
-          <a:p>
-            <a:pPr>
-              <a:spcAft>
-                <a:spcPts val="600"/>
-              </a:spcAft>
-            </a:pPr>
-            <a:r>
-              <a:rPr lang="en-GB" b="1" dirty="0"/>
-              <a:t>On-Cloud</a:t>
-            </a:r>
-          </a:p>
-          <a:p>
-            <a:r>
-              <a:rPr lang="en-GB" dirty="0"/>
-              <a:t>a. Our system is entirely hosted on Cloud.</a:t>
-            </a:r>
-            <a:endParaRPr lang="en-GB" sz="1800" b="1" dirty="0"/>
-          </a:p>
-        </p:txBody>
-      </p:sp>
+        </p:spPr>
+      </p:pic>
     </p:spTree>
     <p:extLst>
       <p:ext uri="{BB962C8B-B14F-4D97-AF65-F5344CB8AC3E}">
-        <p14:creationId xmlns:p14="http://schemas.microsoft.com/office/powerpoint/2010/main" val="1729995777"/>
-      </p:ext>
-    </p:extLst>
-  </p:cSld>
-  <p:clrMapOvr>
-    <a:masterClrMapping/>
-  </p:clrMapOvr>
-</p:sld>
-</file>
-
-<file path=ppt/slides/slide8.xml><?xml version="1.0" encoding="utf-8"?>
-<p:sld xmlns:a="http://schemas.openxmlformats.org/drawingml/2006/main" xmlns:r="http://schemas.openxmlformats.org/officeDocument/2006/relationships" xmlns:p="http://schemas.openxmlformats.org/presentationml/2006/main">
-  <p:cSld>
-    <p:spTree>
-      <p:nvGrpSpPr>
-        <p:cNvPr id="1" name="">
-          <a:extLst>
-            <a:ext uri="{FF2B5EF4-FFF2-40B4-BE49-F238E27FC236}">
-              <a16:creationId xmlns:a16="http://schemas.microsoft.com/office/drawing/2014/main" id="{91CA18F1-84A4-C1A7-AF7C-761853EA7C2D}"/>
-            </a:ext>
-          </a:extLst>
-        </p:cNvPr>
-        <p:cNvGrpSpPr/>
-        <p:nvPr/>
-      </p:nvGrpSpPr>
-      <p:grpSpPr>
-        <a:xfrm>
-          <a:off x="0" y="0"/>
-          <a:ext cx="0" cy="0"/>
-          <a:chOff x="0" y="0"/>
-          <a:chExt cx="0" cy="0"/>
-        </a:xfrm>
-      </p:grpSpPr>
-      <p:sp>
-        <p:nvSpPr>
-          <p:cNvPr id="3" name="Title 2">
-            <a:extLst>
-              <a:ext uri="{FF2B5EF4-FFF2-40B4-BE49-F238E27FC236}">
-                <a16:creationId xmlns:a16="http://schemas.microsoft.com/office/drawing/2014/main" id="{B53493E1-25A4-E25B-05BB-2A10570D2056}"/>
-              </a:ext>
-            </a:extLst>
-          </p:cNvPr>
-          <p:cNvSpPr>
-            <a:spLocks noGrp="1"/>
-          </p:cNvSpPr>
-          <p:nvPr>
-            <p:ph type="title"/>
-          </p:nvPr>
-        </p:nvSpPr>
-        <p:spPr>
-          <a:xfrm>
-            <a:off x="254645" y="137270"/>
-            <a:ext cx="6971271" cy="543697"/>
-          </a:xfrm>
-        </p:spPr>
-        <p:txBody>
-          <a:bodyPr>
-            <a:normAutofit/>
-          </a:bodyPr>
-          <a:lstStyle/>
-          <a:p>
-            <a:r>
-              <a:rPr lang="it-IT" dirty="0">
-                <a:latin typeface="Verdana" panose="020B0604030504040204" pitchFamily="34" charset="0"/>
-                <a:ea typeface="Verdana" panose="020B0604030504040204" pitchFamily="34" charset="0"/>
-              </a:rPr>
-              <a:t>DD - Architecture</a:t>
-            </a:r>
-          </a:p>
-        </p:txBody>
-      </p:sp>
-      <p:sp>
-        <p:nvSpPr>
-          <p:cNvPr id="4" name="TextBox 3">
-            <a:extLst>
-              <a:ext uri="{FF2B5EF4-FFF2-40B4-BE49-F238E27FC236}">
-                <a16:creationId xmlns:a16="http://schemas.microsoft.com/office/drawing/2014/main" id="{F8A206A6-C18B-C590-FB74-10DF7D28CA14}"/>
-              </a:ext>
-            </a:extLst>
-          </p:cNvPr>
-          <p:cNvSpPr txBox="1"/>
-          <p:nvPr/>
-        </p:nvSpPr>
-        <p:spPr>
-          <a:xfrm>
-            <a:off x="689298" y="1449109"/>
-            <a:ext cx="10068897" cy="3801041"/>
-          </a:xfrm>
-          <a:prstGeom prst="rect">
-            <a:avLst/>
-          </a:prstGeom>
-          <a:noFill/>
-        </p:spPr>
-        <p:txBody>
-          <a:bodyPr wrap="square">
-            <a:spAutoFit/>
-          </a:bodyPr>
-          <a:lstStyle/>
-          <a:p>
-            <a:pPr>
-              <a:spcAft>
-                <a:spcPts val="600"/>
-              </a:spcAft>
-            </a:pPr>
-            <a:r>
-              <a:rPr lang="en-GB" b="1" dirty="0"/>
-              <a:t>Why not Microservices?</a:t>
-            </a:r>
-          </a:p>
-          <a:p>
-            <a:r>
-              <a:rPr lang="en-GB" dirty="0"/>
-              <a:t>a.</a:t>
-            </a:r>
-            <a:r>
-              <a:rPr lang="en-GB" b="0" i="0" dirty="0">
-                <a:effectLst/>
-              </a:rPr>
-              <a:t> Pointless overhead</a:t>
-            </a:r>
-            <a:endParaRPr lang="en-GB" sz="1800" dirty="0"/>
-          </a:p>
-          <a:p>
-            <a:r>
-              <a:rPr lang="en-GB" dirty="0"/>
-              <a:t>b.</a:t>
-            </a:r>
-            <a:r>
-              <a:rPr lang="en-GB" sz="1800" dirty="0"/>
-              <a:t> The system is small</a:t>
-            </a:r>
-          </a:p>
-          <a:p>
-            <a:endParaRPr lang="en-GB" sz="1800" dirty="0"/>
-          </a:p>
-          <a:p>
-            <a:pPr>
-              <a:spcAft>
-                <a:spcPts val="600"/>
-              </a:spcAft>
-            </a:pPr>
-            <a:r>
-              <a:rPr lang="en-GB" b="1" dirty="0"/>
-              <a:t>Why RESTful APIs?</a:t>
-            </a:r>
-          </a:p>
-          <a:p>
-            <a:r>
-              <a:rPr lang="en-GB" dirty="0"/>
-              <a:t>a. </a:t>
-            </a:r>
-            <a:r>
-              <a:rPr lang="en-GB" sz="1800" dirty="0"/>
-              <a:t>Simplicity</a:t>
-            </a:r>
-          </a:p>
-          <a:p>
-            <a:r>
-              <a:rPr lang="en-GB" dirty="0"/>
-              <a:t>b.</a:t>
-            </a:r>
-            <a:r>
-              <a:rPr lang="en-GB" sz="1800" dirty="0"/>
-              <a:t> Standardization</a:t>
-            </a:r>
-          </a:p>
-          <a:p>
-            <a:endParaRPr lang="en-GB" sz="1800" b="1" dirty="0"/>
-          </a:p>
-          <a:p>
-            <a:pPr>
-              <a:spcAft>
-                <a:spcPts val="600"/>
-              </a:spcAft>
-            </a:pPr>
-            <a:r>
-              <a:rPr lang="en-GB" b="1" dirty="0"/>
-              <a:t>On-Cloud</a:t>
-            </a:r>
-          </a:p>
-          <a:p>
-            <a:pPr>
-              <a:spcAft>
-                <a:spcPts val="600"/>
-              </a:spcAft>
-            </a:pPr>
-            <a:r>
-              <a:rPr lang="en-GB" i="0" dirty="0">
-                <a:effectLst/>
-              </a:rPr>
-              <a:t>a. Availability</a:t>
-            </a:r>
-          </a:p>
-          <a:p>
-            <a:pPr>
-              <a:spcAft>
-                <a:spcPts val="600"/>
-              </a:spcAft>
-            </a:pPr>
-            <a:r>
-              <a:rPr lang="en-GB" dirty="0"/>
-              <a:t>b. </a:t>
-            </a:r>
-            <a:r>
-              <a:rPr lang="en-GB" i="0" dirty="0">
-                <a:effectLst/>
-              </a:rPr>
-              <a:t>Scalability</a:t>
-            </a:r>
-          </a:p>
-          <a:p>
-            <a:pPr>
-              <a:spcAft>
-                <a:spcPts val="600"/>
-              </a:spcAft>
-            </a:pPr>
-            <a:endParaRPr lang="en-GB" dirty="0"/>
-          </a:p>
-        </p:txBody>
-      </p:sp>
-    </p:spTree>
-    <p:extLst>
-      <p:ext uri="{BB962C8B-B14F-4D97-AF65-F5344CB8AC3E}">
-        <p14:creationId xmlns:p14="http://schemas.microsoft.com/office/powerpoint/2010/main" val="3194443352"/>
-      </p:ext>
-    </p:extLst>
-  </p:cSld>
-  <p:clrMapOvr>
-    <a:masterClrMapping/>
-  </p:clrMapOvr>
-</p:sld>
-</file>
-
-<file path=ppt/slides/slide9.xml><?xml version="1.0" encoding="utf-8"?>
-<p:sld xmlns:a="http://schemas.openxmlformats.org/drawingml/2006/main" xmlns:r="http://schemas.openxmlformats.org/officeDocument/2006/relationships" xmlns:p="http://schemas.openxmlformats.org/presentationml/2006/main">
-  <p:cSld>
-    <p:spTree>
-      <p:nvGrpSpPr>
-        <p:cNvPr id="1" name="">
-          <a:extLst>
-            <a:ext uri="{FF2B5EF4-FFF2-40B4-BE49-F238E27FC236}">
-              <a16:creationId xmlns:a16="http://schemas.microsoft.com/office/drawing/2014/main" id="{11A83AB1-8499-8DCA-9033-EFD2BEFF88ED}"/>
-            </a:ext>
-          </a:extLst>
-        </p:cNvPr>
-        <p:cNvGrpSpPr/>
-        <p:nvPr/>
-      </p:nvGrpSpPr>
-      <p:grpSpPr>
-        <a:xfrm>
-          <a:off x="0" y="0"/>
-          <a:ext cx="0" cy="0"/>
-          <a:chOff x="0" y="0"/>
-          <a:chExt cx="0" cy="0"/>
-        </a:xfrm>
-      </p:grpSpPr>
-      <p:sp>
-        <p:nvSpPr>
-          <p:cNvPr id="3" name="Title 2">
-            <a:extLst>
-              <a:ext uri="{FF2B5EF4-FFF2-40B4-BE49-F238E27FC236}">
-                <a16:creationId xmlns:a16="http://schemas.microsoft.com/office/drawing/2014/main" id="{C5EFB38F-B749-9392-F44D-C2448D7D5EA3}"/>
-              </a:ext>
-            </a:extLst>
-          </p:cNvPr>
-          <p:cNvSpPr>
-            <a:spLocks noGrp="1"/>
-          </p:cNvSpPr>
-          <p:nvPr>
-            <p:ph type="title"/>
-          </p:nvPr>
-        </p:nvSpPr>
-        <p:spPr>
-          <a:xfrm>
-            <a:off x="254645" y="137270"/>
-            <a:ext cx="6971271" cy="543697"/>
-          </a:xfrm>
-        </p:spPr>
-        <p:txBody>
-          <a:bodyPr>
-            <a:normAutofit/>
-          </a:bodyPr>
-          <a:lstStyle/>
-          <a:p>
-            <a:r>
-              <a:rPr lang="it-IT" dirty="0">
-                <a:latin typeface="Verdana" panose="020B0604030504040204" pitchFamily="34" charset="0"/>
-                <a:ea typeface="Verdana" panose="020B0604030504040204" pitchFamily="34" charset="0"/>
-              </a:rPr>
-              <a:t>DD - Other design choices</a:t>
-            </a:r>
-          </a:p>
-        </p:txBody>
-      </p:sp>
-      <p:sp>
-        <p:nvSpPr>
-          <p:cNvPr id="4" name="TextBox 3">
-            <a:extLst>
-              <a:ext uri="{FF2B5EF4-FFF2-40B4-BE49-F238E27FC236}">
-                <a16:creationId xmlns:a16="http://schemas.microsoft.com/office/drawing/2014/main" id="{C2E4C377-52A6-6FE8-300D-F632DB2F584B}"/>
-              </a:ext>
-            </a:extLst>
-          </p:cNvPr>
-          <p:cNvSpPr txBox="1"/>
-          <p:nvPr/>
-        </p:nvSpPr>
-        <p:spPr>
-          <a:xfrm>
-            <a:off x="689298" y="1449109"/>
-            <a:ext cx="10068897" cy="3924151"/>
-          </a:xfrm>
-          <a:prstGeom prst="rect">
-            <a:avLst/>
-          </a:prstGeom>
-          <a:noFill/>
-        </p:spPr>
-        <p:txBody>
-          <a:bodyPr wrap="square">
-            <a:spAutoFit/>
-          </a:bodyPr>
-          <a:lstStyle/>
-          <a:p>
-            <a:pPr>
-              <a:spcAft>
-                <a:spcPts val="600"/>
-              </a:spcAft>
-            </a:pPr>
-            <a:r>
-              <a:rPr lang="en-GB" b="1" dirty="0"/>
-              <a:t>Relational Database</a:t>
-            </a:r>
-          </a:p>
-          <a:p>
-            <a:r>
-              <a:rPr lang="en-GB" dirty="0"/>
-              <a:t>a.</a:t>
-            </a:r>
-            <a:r>
-              <a:rPr lang="en-GB" b="0" i="0" dirty="0">
-                <a:effectLst/>
-              </a:rPr>
-              <a:t> </a:t>
-            </a:r>
-            <a:r>
-              <a:rPr lang="en-GB" dirty="0"/>
-              <a:t>ACID</a:t>
-            </a:r>
-            <a:endParaRPr lang="en-GB" sz="1800" dirty="0"/>
-          </a:p>
-          <a:p>
-            <a:pPr>
-              <a:spcAft>
-                <a:spcPts val="600"/>
-              </a:spcAft>
-            </a:pPr>
-            <a:r>
-              <a:rPr lang="en-GB" dirty="0"/>
-              <a:t>b.</a:t>
-            </a:r>
-            <a:r>
-              <a:rPr lang="en-GB" sz="1800" dirty="0"/>
-              <a:t> </a:t>
-            </a:r>
-            <a:r>
-              <a:rPr lang="en-GB" i="0" dirty="0">
-                <a:effectLst/>
-              </a:rPr>
-              <a:t>Widespread Language Support</a:t>
-            </a:r>
-            <a:br>
-              <a:rPr lang="en-GB" b="1" i="0" dirty="0">
-                <a:effectLst/>
-              </a:rPr>
-            </a:br>
-            <a:br>
-              <a:rPr lang="en-GB" b="1" i="0" dirty="0">
-                <a:effectLst/>
-              </a:rPr>
-            </a:br>
-            <a:r>
-              <a:rPr lang="en-GB" b="1" dirty="0"/>
-              <a:t>Token-Based Authentication and Authorization</a:t>
-            </a:r>
-          </a:p>
-          <a:p>
-            <a:pPr marL="342900" indent="-342900">
-              <a:buAutoNum type="alphaLcPeriod"/>
-            </a:pPr>
-            <a:r>
-              <a:rPr lang="en-GB" dirty="0">
-                <a:latin typeface="Söhne"/>
-              </a:rPr>
-              <a:t>Compatibility with REST</a:t>
-            </a:r>
-          </a:p>
-          <a:p>
-            <a:pPr marL="342900" indent="-342900">
-              <a:buAutoNum type="alphaLcPeriod"/>
-            </a:pPr>
-            <a:r>
-              <a:rPr lang="en-GB" i="0" dirty="0">
-                <a:effectLst/>
-                <a:latin typeface="Söhne"/>
-              </a:rPr>
-              <a:t>Performance (Reducing database load)</a:t>
-            </a:r>
-          </a:p>
-          <a:p>
-            <a:pPr marL="342900" indent="-342900">
-              <a:buAutoNum type="alphaLcPeriod"/>
-            </a:pPr>
-            <a:r>
-              <a:rPr lang="en-GB" dirty="0">
-                <a:latin typeface="Söhne"/>
-              </a:rPr>
-              <a:t>C</a:t>
-            </a:r>
-            <a:r>
-              <a:rPr lang="en-GB" i="0" dirty="0">
-                <a:effectLst/>
-                <a:latin typeface="Söhne"/>
-              </a:rPr>
-              <a:t>ookies complicate scalability</a:t>
-            </a:r>
-          </a:p>
-          <a:p>
-            <a:pPr marL="342900" indent="-342900">
-              <a:buAutoNum type="alphaLcPeriod"/>
-            </a:pPr>
-            <a:endParaRPr lang="en-GB" dirty="0">
-              <a:latin typeface="Söhne"/>
-            </a:endParaRPr>
-          </a:p>
-          <a:p>
-            <a:pPr>
-              <a:spcAft>
-                <a:spcPts val="600"/>
-              </a:spcAft>
-            </a:pPr>
-            <a:r>
-              <a:rPr lang="en-GB" b="1" dirty="0"/>
-              <a:t>Distributed MVC</a:t>
-            </a:r>
-          </a:p>
-          <a:p>
-            <a:pPr marL="342900" indent="-342900">
-              <a:buAutoNum type="alphaLcPeriod"/>
-            </a:pPr>
-            <a:r>
-              <a:rPr lang="en-GB" dirty="0"/>
-              <a:t>Compatibility with 3-tier</a:t>
-            </a:r>
-          </a:p>
-          <a:p>
-            <a:pPr marL="342900" indent="-342900">
-              <a:buAutoNum type="alphaLcPeriod"/>
-            </a:pPr>
-            <a:r>
-              <a:rPr lang="en-GB" dirty="0"/>
-              <a:t>Maintainability</a:t>
-            </a:r>
-          </a:p>
-          <a:p>
-            <a:pPr marL="342900" indent="-342900">
-              <a:buAutoNum type="alphaLcPeriod"/>
-            </a:pPr>
-            <a:endParaRPr lang="en-GB" dirty="0"/>
-          </a:p>
-        </p:txBody>
-      </p:sp>
-    </p:spTree>
-    <p:extLst>
-      <p:ext uri="{BB962C8B-B14F-4D97-AF65-F5344CB8AC3E}">
-        <p14:creationId xmlns:p14="http://schemas.microsoft.com/office/powerpoint/2010/main" val="281468513"/>
+        <p14:creationId xmlns:p14="http://schemas.microsoft.com/office/powerpoint/2010/main" val="1123970124"/>
       </p:ext>
     </p:extLst>
   </p:cSld>

</xml_diff>